<commit_message>
new OH for varun
</commit_message>
<xml_diff>
--- a/slides/Approx-01-Intro.pptx
+++ b/slides/Approx-01-Intro.pptx
@@ -5,17 +5,32 @@
     <p:sldMasterId id="2147484006" r:id="rId1"/>
   </p:sldMasterIdLst>
   <p:notesMasterIdLst>
-    <p:notesMasterId r:id="rId10"/>
+    <p:notesMasterId r:id="rId25"/>
   </p:notesMasterIdLst>
   <p:sldIdLst>
     <p:sldId id="256" r:id="rId2"/>
     <p:sldId id="286" r:id="rId3"/>
     <p:sldId id="292" r:id="rId4"/>
-    <p:sldId id="358" r:id="rId5"/>
-    <p:sldId id="359" r:id="rId6"/>
-    <p:sldId id="360" r:id="rId7"/>
-    <p:sldId id="357" r:id="rId8"/>
-    <p:sldId id="333" r:id="rId9"/>
+    <p:sldId id="361" r:id="rId5"/>
+    <p:sldId id="362" r:id="rId6"/>
+    <p:sldId id="358" r:id="rId7"/>
+    <p:sldId id="363" r:id="rId8"/>
+    <p:sldId id="364" r:id="rId9"/>
+    <p:sldId id="365" r:id="rId10"/>
+    <p:sldId id="366" r:id="rId11"/>
+    <p:sldId id="359" r:id="rId12"/>
+    <p:sldId id="367" r:id="rId13"/>
+    <p:sldId id="368" r:id="rId14"/>
+    <p:sldId id="369" r:id="rId15"/>
+    <p:sldId id="370" r:id="rId16"/>
+    <p:sldId id="371" r:id="rId17"/>
+    <p:sldId id="360" r:id="rId18"/>
+    <p:sldId id="372" r:id="rId19"/>
+    <p:sldId id="373" r:id="rId20"/>
+    <p:sldId id="374" r:id="rId21"/>
+    <p:sldId id="375" r:id="rId22"/>
+    <p:sldId id="357" r:id="rId23"/>
+    <p:sldId id="333" r:id="rId24"/>
   </p:sldIdLst>
   <p:sldSz cx="12192000" cy="6858000"/>
   <p:notesSz cx="6858000" cy="9144000"/>
@@ -204,7 +219,7 @@
           <a:p>
             <a:fld id="{C5B45307-6ED4-B142-BD64-10F739779302}" type="datetimeFigureOut">
               <a:rPr lang="en-US" smtClean="0"/>
-              <a:t>3/23/23</a:t>
+              <a:t>3/19/25</a:t>
             </a:fld>
             <a:endParaRPr lang="en-US"/>
           </a:p>
@@ -612,7 +627,7 @@
           <a:noFill/>
           <a:extLst>
             <a:ext uri="{909E8E84-426E-40dd-AFC4-6F175D3DCCD1}">
-              <a14:hiddenFill xmlns="" xmlns:a14="http://schemas.microsoft.com/office/drawing/2010/main">
+              <a14:hiddenFill xmlns:a14="http://schemas.microsoft.com/office/drawing/2010/main" xmlns="">
                 <a:solidFill>
                   <a:srgbClr val="FFFFFF"/>
                 </a:solidFill>
@@ -671,7 +686,7 @@
             </a:ln>
             <a:extLst>
               <a:ext uri="{91240B29-F687-4f45-9708-019B960494DF}">
-                <a14:hiddenLine xmlns="" xmlns:a14="http://schemas.microsoft.com/office/drawing/2010/main" w="9525">
+                <a14:hiddenLine xmlns:a14="http://schemas.microsoft.com/office/drawing/2010/main" xmlns="" w="9525">
                   <a:solidFill>
                     <a:srgbClr val="000000"/>
                   </a:solidFill>
@@ -761,7 +776,7 @@
             </a:ln>
             <a:extLst>
               <a:ext uri="{91240B29-F687-4f45-9708-019B960494DF}">
-                <a14:hiddenLine xmlns="" xmlns:a14="http://schemas.microsoft.com/office/drawing/2010/main" w="9525">
+                <a14:hiddenLine xmlns:a14="http://schemas.microsoft.com/office/drawing/2010/main" xmlns="" w="9525">
                   <a:solidFill>
                     <a:srgbClr val="000000"/>
                   </a:solidFill>
@@ -851,7 +866,7 @@
             </a:ln>
             <a:extLst>
               <a:ext uri="{91240B29-F687-4f45-9708-019B960494DF}">
-                <a14:hiddenLine xmlns="" xmlns:a14="http://schemas.microsoft.com/office/drawing/2010/main" w="9525">
+                <a14:hiddenLine xmlns:a14="http://schemas.microsoft.com/office/drawing/2010/main" xmlns="" w="9525">
                   <a:solidFill>
                     <a:srgbClr val="000000"/>
                   </a:solidFill>
@@ -885,7 +900,7 @@
             </a:ln>
             <a:extLst>
               <a:ext uri="{91240B29-F687-4f45-9708-019B960494DF}">
-                <a14:hiddenLine xmlns="" xmlns:a14="http://schemas.microsoft.com/office/drawing/2010/main" w="9525">
+                <a14:hiddenLine xmlns:a14="http://schemas.microsoft.com/office/drawing/2010/main" xmlns="" w="9525">
                   <a:solidFill>
                     <a:srgbClr val="000000"/>
                   </a:solidFill>
@@ -975,7 +990,7 @@
             </a:ln>
             <a:extLst>
               <a:ext uri="{91240B29-F687-4f45-9708-019B960494DF}">
-                <a14:hiddenLine xmlns="" xmlns:a14="http://schemas.microsoft.com/office/drawing/2010/main" w="9525">
+                <a14:hiddenLine xmlns:a14="http://schemas.microsoft.com/office/drawing/2010/main" xmlns="" w="9525">
                   <a:solidFill>
                     <a:srgbClr val="000000"/>
                   </a:solidFill>
@@ -1037,7 +1052,7 @@
             </a:ln>
             <a:extLst>
               <a:ext uri="{91240B29-F687-4f45-9708-019B960494DF}">
-                <a14:hiddenLine xmlns="" xmlns:a14="http://schemas.microsoft.com/office/drawing/2010/main" w="9525">
+                <a14:hiddenLine xmlns:a14="http://schemas.microsoft.com/office/drawing/2010/main" xmlns="" w="9525">
                   <a:solidFill>
                     <a:srgbClr val="000000"/>
                   </a:solidFill>
@@ -1099,7 +1114,7 @@
             </a:ln>
             <a:extLst>
               <a:ext uri="{91240B29-F687-4f45-9708-019B960494DF}">
-                <a14:hiddenLine xmlns="" xmlns:a14="http://schemas.microsoft.com/office/drawing/2010/main" w="9525">
+                <a14:hiddenLine xmlns:a14="http://schemas.microsoft.com/office/drawing/2010/main" xmlns="" w="9525">
                   <a:solidFill>
                     <a:srgbClr val="000000"/>
                   </a:solidFill>
@@ -1189,7 +1204,7 @@
             </a:ln>
             <a:extLst>
               <a:ext uri="{91240B29-F687-4f45-9708-019B960494DF}">
-                <a14:hiddenLine xmlns="" xmlns:a14="http://schemas.microsoft.com/office/drawing/2010/main" w="9525">
+                <a14:hiddenLine xmlns:a14="http://schemas.microsoft.com/office/drawing/2010/main" xmlns="" w="9525">
                   <a:solidFill>
                     <a:srgbClr val="000000"/>
                   </a:solidFill>
@@ -1251,7 +1266,7 @@
             </a:ln>
             <a:extLst>
               <a:ext uri="{91240B29-F687-4f45-9708-019B960494DF}">
-                <a14:hiddenLine xmlns="" xmlns:a14="http://schemas.microsoft.com/office/drawing/2010/main" w="9525">
+                <a14:hiddenLine xmlns:a14="http://schemas.microsoft.com/office/drawing/2010/main" xmlns="" w="9525">
                   <a:solidFill>
                     <a:srgbClr val="000000"/>
                   </a:solidFill>
@@ -1313,7 +1328,7 @@
             </a:ln>
             <a:extLst>
               <a:ext uri="{91240B29-F687-4f45-9708-019B960494DF}">
-                <a14:hiddenLine xmlns="" xmlns:a14="http://schemas.microsoft.com/office/drawing/2010/main" w="9525">
+                <a14:hiddenLine xmlns:a14="http://schemas.microsoft.com/office/drawing/2010/main" xmlns="" w="9525">
                   <a:solidFill>
                     <a:srgbClr val="000000"/>
                   </a:solidFill>
@@ -1403,7 +1418,7 @@
             </a:ln>
             <a:extLst>
               <a:ext uri="{91240B29-F687-4f45-9708-019B960494DF}">
-                <a14:hiddenLine xmlns="" xmlns:a14="http://schemas.microsoft.com/office/drawing/2010/main" w="9525">
+                <a14:hiddenLine xmlns:a14="http://schemas.microsoft.com/office/drawing/2010/main" xmlns="" w="9525">
                   <a:solidFill>
                     <a:srgbClr val="000000"/>
                   </a:solidFill>
@@ -1493,7 +1508,7 @@
             </a:ln>
             <a:extLst>
               <a:ext uri="{91240B29-F687-4f45-9708-019B960494DF}">
-                <a14:hiddenLine xmlns="" xmlns:a14="http://schemas.microsoft.com/office/drawing/2010/main" w="9525">
+                <a14:hiddenLine xmlns:a14="http://schemas.microsoft.com/office/drawing/2010/main" xmlns="" w="9525">
                   <a:solidFill>
                     <a:srgbClr val="000000"/>
                   </a:solidFill>
@@ -1555,7 +1570,7 @@
             </a:ln>
             <a:extLst>
               <a:ext uri="{91240B29-F687-4f45-9708-019B960494DF}">
-                <a14:hiddenLine xmlns="" xmlns:a14="http://schemas.microsoft.com/office/drawing/2010/main" w="9525">
+                <a14:hiddenLine xmlns:a14="http://schemas.microsoft.com/office/drawing/2010/main" xmlns="" w="9525">
                   <a:solidFill>
                     <a:srgbClr val="000000"/>
                   </a:solidFill>
@@ -1665,7 +1680,7 @@
             </a:ln>
             <a:extLst>
               <a:ext uri="{91240B29-F687-4f45-9708-019B960494DF}">
-                <a14:hiddenLine xmlns="" xmlns:a14="http://schemas.microsoft.com/office/drawing/2010/main" w="9525">
+                <a14:hiddenLine xmlns:a14="http://schemas.microsoft.com/office/drawing/2010/main" xmlns="" w="9525">
                   <a:solidFill>
                     <a:srgbClr val="000000"/>
                   </a:solidFill>
@@ -1727,7 +1742,7 @@
             </a:ln>
             <a:extLst>
               <a:ext uri="{91240B29-F687-4f45-9708-019B960494DF}">
-                <a14:hiddenLine xmlns="" xmlns:a14="http://schemas.microsoft.com/office/drawing/2010/main" w="9525">
+                <a14:hiddenLine xmlns:a14="http://schemas.microsoft.com/office/drawing/2010/main" xmlns="" w="9525">
                   <a:solidFill>
                     <a:srgbClr val="000000"/>
                   </a:solidFill>
@@ -1817,7 +1832,7 @@
             </a:ln>
             <a:extLst>
               <a:ext uri="{91240B29-F687-4f45-9708-019B960494DF}">
-                <a14:hiddenLine xmlns="" xmlns:a14="http://schemas.microsoft.com/office/drawing/2010/main" w="9525">
+                <a14:hiddenLine xmlns:a14="http://schemas.microsoft.com/office/drawing/2010/main" xmlns="" w="9525">
                   <a:solidFill>
                     <a:srgbClr val="000000"/>
                   </a:solidFill>
@@ -1907,7 +1922,7 @@
             </a:ln>
             <a:extLst>
               <a:ext uri="{91240B29-F687-4f45-9708-019B960494DF}">
-                <a14:hiddenLine xmlns="" xmlns:a14="http://schemas.microsoft.com/office/drawing/2010/main" w="9525">
+                <a14:hiddenLine xmlns:a14="http://schemas.microsoft.com/office/drawing/2010/main" xmlns="" w="9525">
                   <a:solidFill>
                     <a:srgbClr val="000000"/>
                   </a:solidFill>
@@ -1969,7 +1984,7 @@
             </a:ln>
             <a:extLst>
               <a:ext uri="{91240B29-F687-4f45-9708-019B960494DF}">
-                <a14:hiddenLine xmlns="" xmlns:a14="http://schemas.microsoft.com/office/drawing/2010/main" w="9525">
+                <a14:hiddenLine xmlns:a14="http://schemas.microsoft.com/office/drawing/2010/main" xmlns="" w="9525">
                   <a:solidFill>
                     <a:srgbClr val="000000"/>
                   </a:solidFill>
@@ -2059,7 +2074,7 @@
             </a:ln>
             <a:extLst>
               <a:ext uri="{91240B29-F687-4f45-9708-019B960494DF}">
-                <a14:hiddenLine xmlns="" xmlns:a14="http://schemas.microsoft.com/office/drawing/2010/main" w="9525">
+                <a14:hiddenLine xmlns:a14="http://schemas.microsoft.com/office/drawing/2010/main" xmlns="" w="9525">
                   <a:solidFill>
                     <a:srgbClr val="000000"/>
                   </a:solidFill>
@@ -2149,7 +2164,7 @@
             </a:ln>
             <a:extLst>
               <a:ext uri="{91240B29-F687-4f45-9708-019B960494DF}">
-                <a14:hiddenLine xmlns="" xmlns:a14="http://schemas.microsoft.com/office/drawing/2010/main" w="9525">
+                <a14:hiddenLine xmlns:a14="http://schemas.microsoft.com/office/drawing/2010/main" xmlns="" w="9525">
                   <a:solidFill>
                     <a:srgbClr val="000000"/>
                   </a:solidFill>
@@ -2205,7 +2220,7 @@
             </a:ln>
             <a:extLst>
               <a:ext uri="{91240B29-F687-4f45-9708-019B960494DF}">
-                <a14:hiddenLine xmlns="" xmlns:a14="http://schemas.microsoft.com/office/drawing/2010/main" w="9525">
+                <a14:hiddenLine xmlns:a14="http://schemas.microsoft.com/office/drawing/2010/main" xmlns="" w="9525">
                   <a:solidFill>
                     <a:srgbClr val="000000"/>
                   </a:solidFill>
@@ -2295,7 +2310,7 @@
             </a:ln>
             <a:extLst>
               <a:ext uri="{91240B29-F687-4f45-9708-019B960494DF}">
-                <a14:hiddenLine xmlns="" xmlns:a14="http://schemas.microsoft.com/office/drawing/2010/main" w="9525">
+                <a14:hiddenLine xmlns:a14="http://schemas.microsoft.com/office/drawing/2010/main" xmlns="" w="9525">
                   <a:solidFill>
                     <a:srgbClr val="000000"/>
                   </a:solidFill>
@@ -2351,7 +2366,7 @@
             </a:ln>
             <a:extLst>
               <a:ext uri="{91240B29-F687-4f45-9708-019B960494DF}">
-                <a14:hiddenLine xmlns="" xmlns:a14="http://schemas.microsoft.com/office/drawing/2010/main" w="9525">
+                <a14:hiddenLine xmlns:a14="http://schemas.microsoft.com/office/drawing/2010/main" xmlns="" w="9525">
                   <a:solidFill>
                     <a:srgbClr val="000000"/>
                   </a:solidFill>
@@ -2441,7 +2456,7 @@
             </a:ln>
             <a:extLst>
               <a:ext uri="{91240B29-F687-4f45-9708-019B960494DF}">
-                <a14:hiddenLine xmlns="" xmlns:a14="http://schemas.microsoft.com/office/drawing/2010/main" w="9525">
+                <a14:hiddenLine xmlns:a14="http://schemas.microsoft.com/office/drawing/2010/main" xmlns="" w="9525">
                   <a:solidFill>
                     <a:srgbClr val="000000"/>
                   </a:solidFill>
@@ -2509,7 +2524,7 @@
             </a:ln>
             <a:extLst>
               <a:ext uri="{91240B29-F687-4f45-9708-019B960494DF}">
-                <a14:hiddenLine xmlns="" xmlns:a14="http://schemas.microsoft.com/office/drawing/2010/main" w="9525">
+                <a14:hiddenLine xmlns:a14="http://schemas.microsoft.com/office/drawing/2010/main" xmlns="" w="9525">
                   <a:solidFill>
                     <a:srgbClr val="000000"/>
                   </a:solidFill>
@@ -2599,7 +2614,7 @@
             </a:ln>
             <a:extLst>
               <a:ext uri="{91240B29-F687-4f45-9708-019B960494DF}">
-                <a14:hiddenLine xmlns="" xmlns:a14="http://schemas.microsoft.com/office/drawing/2010/main" w="9525">
+                <a14:hiddenLine xmlns:a14="http://schemas.microsoft.com/office/drawing/2010/main" xmlns="" w="9525">
                   <a:solidFill>
                     <a:srgbClr val="000000"/>
                   </a:solidFill>
@@ -2667,7 +2682,7 @@
             </a:ln>
             <a:extLst>
               <a:ext uri="{91240B29-F687-4f45-9708-019B960494DF}">
-                <a14:hiddenLine xmlns="" xmlns:a14="http://schemas.microsoft.com/office/drawing/2010/main" w="9525">
+                <a14:hiddenLine xmlns:a14="http://schemas.microsoft.com/office/drawing/2010/main" xmlns="" w="9525">
                   <a:solidFill>
                     <a:srgbClr val="000000"/>
                   </a:solidFill>
@@ -2757,7 +2772,7 @@
             </a:ln>
             <a:extLst>
               <a:ext uri="{91240B29-F687-4f45-9708-019B960494DF}">
-                <a14:hiddenLine xmlns="" xmlns:a14="http://schemas.microsoft.com/office/drawing/2010/main" w="9525">
+                <a14:hiddenLine xmlns:a14="http://schemas.microsoft.com/office/drawing/2010/main" xmlns="" w="9525">
                   <a:solidFill>
                     <a:srgbClr val="000000"/>
                   </a:solidFill>
@@ -2791,7 +2806,7 @@
             </a:ln>
             <a:extLst>
               <a:ext uri="{91240B29-F687-4f45-9708-019B960494DF}">
-                <a14:hiddenLine xmlns="" xmlns:a14="http://schemas.microsoft.com/office/drawing/2010/main" w="9525">
+                <a14:hiddenLine xmlns:a14="http://schemas.microsoft.com/office/drawing/2010/main" xmlns="" w="9525">
                   <a:solidFill>
                     <a:srgbClr val="000000"/>
                   </a:solidFill>
@@ -2881,7 +2896,7 @@
             </a:ln>
             <a:extLst>
               <a:ext uri="{91240B29-F687-4f45-9708-019B960494DF}">
-                <a14:hiddenLine xmlns="" xmlns:a14="http://schemas.microsoft.com/office/drawing/2010/main" w="9525">
+                <a14:hiddenLine xmlns:a14="http://schemas.microsoft.com/office/drawing/2010/main" xmlns="" w="9525">
                   <a:solidFill>
                     <a:srgbClr val="000000"/>
                   </a:solidFill>
@@ -2943,7 +2958,7 @@
             </a:ln>
             <a:extLst>
               <a:ext uri="{91240B29-F687-4f45-9708-019B960494DF}">
-                <a14:hiddenLine xmlns="" xmlns:a14="http://schemas.microsoft.com/office/drawing/2010/main" w="9525">
+                <a14:hiddenLine xmlns:a14="http://schemas.microsoft.com/office/drawing/2010/main" xmlns="" w="9525">
                   <a:solidFill>
                     <a:srgbClr val="000000"/>
                   </a:solidFill>
@@ -3005,7 +3020,7 @@
             </a:ln>
             <a:extLst>
               <a:ext uri="{91240B29-F687-4f45-9708-019B960494DF}">
-                <a14:hiddenLine xmlns="" xmlns:a14="http://schemas.microsoft.com/office/drawing/2010/main" w="9525">
+                <a14:hiddenLine xmlns:a14="http://schemas.microsoft.com/office/drawing/2010/main" xmlns="" w="9525">
                   <a:solidFill>
                     <a:srgbClr val="000000"/>
                   </a:solidFill>
@@ -3095,7 +3110,7 @@
             </a:ln>
             <a:extLst>
               <a:ext uri="{91240B29-F687-4f45-9708-019B960494DF}">
-                <a14:hiddenLine xmlns="" xmlns:a14="http://schemas.microsoft.com/office/drawing/2010/main" w="9525">
+                <a14:hiddenLine xmlns:a14="http://schemas.microsoft.com/office/drawing/2010/main" xmlns="" w="9525">
                   <a:solidFill>
                     <a:srgbClr val="000000"/>
                   </a:solidFill>
@@ -3163,7 +3178,7 @@
             </a:ln>
             <a:extLst>
               <a:ext uri="{91240B29-F687-4f45-9708-019B960494DF}">
-                <a14:hiddenLine xmlns="" xmlns:a14="http://schemas.microsoft.com/office/drawing/2010/main" w="9525">
+                <a14:hiddenLine xmlns:a14="http://schemas.microsoft.com/office/drawing/2010/main" xmlns="" w="9525">
                   <a:solidFill>
                     <a:srgbClr val="000000"/>
                   </a:solidFill>
@@ -3225,7 +3240,7 @@
             </a:ln>
             <a:extLst>
               <a:ext uri="{91240B29-F687-4f45-9708-019B960494DF}">
-                <a14:hiddenLine xmlns="" xmlns:a14="http://schemas.microsoft.com/office/drawing/2010/main" w="9525">
+                <a14:hiddenLine xmlns:a14="http://schemas.microsoft.com/office/drawing/2010/main" xmlns="" w="9525">
                   <a:solidFill>
                     <a:srgbClr val="000000"/>
                   </a:solidFill>
@@ -3315,7 +3330,7 @@
             </a:ln>
             <a:extLst>
               <a:ext uri="{91240B29-F687-4f45-9708-019B960494DF}">
-                <a14:hiddenLine xmlns="" xmlns:a14="http://schemas.microsoft.com/office/drawing/2010/main" w="9525">
+                <a14:hiddenLine xmlns:a14="http://schemas.microsoft.com/office/drawing/2010/main" xmlns="" w="9525">
                   <a:solidFill>
                     <a:srgbClr val="000000"/>
                   </a:solidFill>
@@ -3377,7 +3392,7 @@
             </a:ln>
             <a:extLst>
               <a:ext uri="{91240B29-F687-4f45-9708-019B960494DF}">
-                <a14:hiddenLine xmlns="" xmlns:a14="http://schemas.microsoft.com/office/drawing/2010/main" w="9525">
+                <a14:hiddenLine xmlns:a14="http://schemas.microsoft.com/office/drawing/2010/main" xmlns="" w="9525">
                   <a:solidFill>
                     <a:srgbClr val="000000"/>
                   </a:solidFill>
@@ -3467,7 +3482,7 @@
             </a:ln>
             <a:extLst>
               <a:ext uri="{91240B29-F687-4f45-9708-019B960494DF}">
-                <a14:hiddenLine xmlns="" xmlns:a14="http://schemas.microsoft.com/office/drawing/2010/main" w="9525">
+                <a14:hiddenLine xmlns:a14="http://schemas.microsoft.com/office/drawing/2010/main" xmlns="" w="9525">
                   <a:solidFill>
                     <a:srgbClr val="000000"/>
                   </a:solidFill>
@@ -3529,7 +3544,7 @@
             </a:ln>
             <a:extLst>
               <a:ext uri="{91240B29-F687-4f45-9708-019B960494DF}">
-                <a14:hiddenLine xmlns="" xmlns:a14="http://schemas.microsoft.com/office/drawing/2010/main" w="9525">
+                <a14:hiddenLine xmlns:a14="http://schemas.microsoft.com/office/drawing/2010/main" xmlns="" w="9525">
                   <a:solidFill>
                     <a:srgbClr val="000000"/>
                   </a:solidFill>
@@ -3619,7 +3634,7 @@
             </a:ln>
             <a:extLst>
               <a:ext uri="{91240B29-F687-4f45-9708-019B960494DF}">
-                <a14:hiddenLine xmlns="" xmlns:a14="http://schemas.microsoft.com/office/drawing/2010/main" w="9525">
+                <a14:hiddenLine xmlns:a14="http://schemas.microsoft.com/office/drawing/2010/main" xmlns="" w="9525">
                   <a:solidFill>
                     <a:srgbClr val="000000"/>
                   </a:solidFill>
@@ -3653,7 +3668,7 @@
             </a:ln>
             <a:extLst>
               <a:ext uri="{91240B29-F687-4f45-9708-019B960494DF}">
-                <a14:hiddenLine xmlns="" xmlns:a14="http://schemas.microsoft.com/office/drawing/2010/main" w="9525">
+                <a14:hiddenLine xmlns:a14="http://schemas.microsoft.com/office/drawing/2010/main" xmlns="" w="9525">
                   <a:solidFill>
                     <a:srgbClr val="000000"/>
                   </a:solidFill>
@@ -3718,7 +3733,7 @@
             </a:ln>
             <a:extLst>
               <a:ext uri="{91240B29-F687-4f45-9708-019B960494DF}">
-                <a14:hiddenLine xmlns="" xmlns:a14="http://schemas.microsoft.com/office/drawing/2010/main" w="9525">
+                <a14:hiddenLine xmlns:a14="http://schemas.microsoft.com/office/drawing/2010/main" xmlns="" w="9525">
                   <a:solidFill>
                     <a:srgbClr val="000000"/>
                   </a:solidFill>
@@ -3808,7 +3823,7 @@
             </a:ln>
             <a:extLst>
               <a:ext uri="{91240B29-F687-4f45-9708-019B960494DF}">
-                <a14:hiddenLine xmlns="" xmlns:a14="http://schemas.microsoft.com/office/drawing/2010/main" w="9525">
+                <a14:hiddenLine xmlns:a14="http://schemas.microsoft.com/office/drawing/2010/main" xmlns="" w="9525">
                   <a:solidFill>
                     <a:srgbClr val="000000"/>
                   </a:solidFill>
@@ -3870,7 +3885,7 @@
             </a:ln>
             <a:extLst>
               <a:ext uri="{91240B29-F687-4f45-9708-019B960494DF}">
-                <a14:hiddenLine xmlns="" xmlns:a14="http://schemas.microsoft.com/office/drawing/2010/main" w="9525">
+                <a14:hiddenLine xmlns:a14="http://schemas.microsoft.com/office/drawing/2010/main" xmlns="" w="9525">
                   <a:solidFill>
                     <a:srgbClr val="000000"/>
                   </a:solidFill>
@@ -3960,7 +3975,7 @@
             </a:ln>
             <a:extLst>
               <a:ext uri="{91240B29-F687-4f45-9708-019B960494DF}">
-                <a14:hiddenLine xmlns="" xmlns:a14="http://schemas.microsoft.com/office/drawing/2010/main" w="9525">
+                <a14:hiddenLine xmlns:a14="http://schemas.microsoft.com/office/drawing/2010/main" xmlns="" w="9525">
                   <a:solidFill>
                     <a:srgbClr val="000000"/>
                   </a:solidFill>
@@ -4050,7 +4065,7 @@
             </a:ln>
             <a:extLst>
               <a:ext uri="{91240B29-F687-4f45-9708-019B960494DF}">
-                <a14:hiddenLine xmlns="" xmlns:a14="http://schemas.microsoft.com/office/drawing/2010/main" w="9525">
+                <a14:hiddenLine xmlns:a14="http://schemas.microsoft.com/office/drawing/2010/main" xmlns="" w="9525">
                   <a:solidFill>
                     <a:srgbClr val="000000"/>
                   </a:solidFill>
@@ -4115,7 +4130,7 @@
             </a:ln>
             <a:extLst>
               <a:ext uri="{91240B29-F687-4f45-9708-019B960494DF}">
-                <a14:hiddenLine xmlns="" xmlns:a14="http://schemas.microsoft.com/office/drawing/2010/main" w="9525">
+                <a14:hiddenLine xmlns:a14="http://schemas.microsoft.com/office/drawing/2010/main" xmlns="" w="9525">
                   <a:solidFill>
                     <a:srgbClr val="000000"/>
                   </a:solidFill>
@@ -4177,7 +4192,7 @@
             </a:ln>
             <a:extLst>
               <a:ext uri="{91240B29-F687-4f45-9708-019B960494DF}">
-                <a14:hiddenLine xmlns="" xmlns:a14="http://schemas.microsoft.com/office/drawing/2010/main" w="9525">
+                <a14:hiddenLine xmlns:a14="http://schemas.microsoft.com/office/drawing/2010/main" xmlns="" w="9525">
                   <a:solidFill>
                     <a:srgbClr val="000000"/>
                   </a:solidFill>
@@ -4267,7 +4282,7 @@
             </a:ln>
             <a:extLst>
               <a:ext uri="{91240B29-F687-4f45-9708-019B960494DF}">
-                <a14:hiddenLine xmlns="" xmlns:a14="http://schemas.microsoft.com/office/drawing/2010/main" w="9525">
+                <a14:hiddenLine xmlns:a14="http://schemas.microsoft.com/office/drawing/2010/main" xmlns="" w="9525">
                   <a:solidFill>
                     <a:srgbClr val="000000"/>
                   </a:solidFill>
@@ -4357,7 +4372,7 @@
             </a:ln>
             <a:extLst>
               <a:ext uri="{91240B29-F687-4f45-9708-019B960494DF}">
-                <a14:hiddenLine xmlns="" xmlns:a14="http://schemas.microsoft.com/office/drawing/2010/main" w="9525">
+                <a14:hiddenLine xmlns:a14="http://schemas.microsoft.com/office/drawing/2010/main" xmlns="" w="9525">
                   <a:solidFill>
                     <a:srgbClr val="000000"/>
                   </a:solidFill>
@@ -4419,7 +4434,7 @@
             </a:ln>
             <a:extLst>
               <a:ext uri="{91240B29-F687-4f45-9708-019B960494DF}">
-                <a14:hiddenLine xmlns="" xmlns:a14="http://schemas.microsoft.com/office/drawing/2010/main" w="9525">
+                <a14:hiddenLine xmlns:a14="http://schemas.microsoft.com/office/drawing/2010/main" xmlns="" w="9525">
                   <a:solidFill>
                     <a:srgbClr val="000000"/>
                   </a:solidFill>
@@ -4539,7 +4554,7 @@
             </a:ln>
             <a:extLst>
               <a:ext uri="{91240B29-F687-4f45-9708-019B960494DF}">
-                <a14:hiddenLine xmlns="" xmlns:a14="http://schemas.microsoft.com/office/drawing/2010/main" w="9525">
+                <a14:hiddenLine xmlns:a14="http://schemas.microsoft.com/office/drawing/2010/main" xmlns="" w="9525">
                   <a:solidFill>
                     <a:srgbClr val="000000"/>
                   </a:solidFill>
@@ -4607,7 +4622,7 @@
             </a:ln>
             <a:extLst>
               <a:ext uri="{91240B29-F687-4f45-9708-019B960494DF}">
-                <a14:hiddenLine xmlns="" xmlns:a14="http://schemas.microsoft.com/office/drawing/2010/main" w="9525">
+                <a14:hiddenLine xmlns:a14="http://schemas.microsoft.com/office/drawing/2010/main" xmlns="" w="9525">
                   <a:solidFill>
                     <a:srgbClr val="000000"/>
                   </a:solidFill>
@@ -4697,7 +4712,7 @@
             </a:ln>
             <a:extLst>
               <a:ext uri="{91240B29-F687-4f45-9708-019B960494DF}">
-                <a14:hiddenLine xmlns="" xmlns:a14="http://schemas.microsoft.com/office/drawing/2010/main" w="9525">
+                <a14:hiddenLine xmlns:a14="http://schemas.microsoft.com/office/drawing/2010/main" xmlns="" w="9525">
                   <a:solidFill>
                     <a:srgbClr val="000000"/>
                   </a:solidFill>
@@ -4837,7 +4852,7 @@
           <a:p>
             <a:fld id="{EC4347D3-4C9A-C240-8F14-750059DFEEB0}" type="datetimeFigureOut">
               <a:rPr lang="en-US" smtClean="0"/>
-              <a:t>3/23/23</a:t>
+              <a:t>3/19/25</a:t>
             </a:fld>
             <a:endParaRPr lang="en-US"/>
           </a:p>
@@ -5104,7 +5119,7 @@
           <a:p>
             <a:fld id="{EC4347D3-4C9A-C240-8F14-750059DFEEB0}" type="datetimeFigureOut">
               <a:rPr lang="en-US" smtClean="0"/>
-              <a:t>3/23/23</a:t>
+              <a:t>3/19/25</a:t>
             </a:fld>
             <a:endParaRPr lang="en-US"/>
           </a:p>
@@ -5300,7 +5315,7 @@
           <a:p>
             <a:fld id="{EC4347D3-4C9A-C240-8F14-750059DFEEB0}" type="datetimeFigureOut">
               <a:rPr lang="en-US" smtClean="0"/>
-              <a:t>3/23/23</a:t>
+              <a:t>3/19/25</a:t>
             </a:fld>
             <a:endParaRPr lang="en-US"/>
           </a:p>
@@ -5563,7 +5578,7 @@
           <a:p>
             <a:fld id="{EC4347D3-4C9A-C240-8F14-750059DFEEB0}" type="datetimeFigureOut">
               <a:rPr lang="en-US" smtClean="0"/>
-              <a:t>3/23/23</a:t>
+              <a:t>3/19/25</a:t>
             </a:fld>
             <a:endParaRPr lang="en-US"/>
           </a:p>
@@ -5997,7 +6012,7 @@
           <a:p>
             <a:fld id="{EC4347D3-4C9A-C240-8F14-750059DFEEB0}" type="datetimeFigureOut">
               <a:rPr lang="en-US" smtClean="0"/>
-              <a:t>3/23/23</a:t>
+              <a:t>3/19/25</a:t>
             </a:fld>
             <a:endParaRPr lang="en-US"/>
           </a:p>
@@ -6543,7 +6558,7 @@
           <a:p>
             <a:fld id="{EC4347D3-4C9A-C240-8F14-750059DFEEB0}" type="datetimeFigureOut">
               <a:rPr lang="en-US" smtClean="0"/>
-              <a:t>3/23/23</a:t>
+              <a:t>3/19/25</a:t>
             </a:fld>
             <a:endParaRPr lang="en-US"/>
           </a:p>
@@ -7263,7 +7278,7 @@
           <a:p>
             <a:fld id="{EC4347D3-4C9A-C240-8F14-750059DFEEB0}" type="datetimeFigureOut">
               <a:rPr lang="en-US" smtClean="0"/>
-              <a:t>3/23/23</a:t>
+              <a:t>3/19/25</a:t>
             </a:fld>
             <a:endParaRPr lang="en-US"/>
           </a:p>
@@ -7433,7 +7448,7 @@
           <a:p>
             <a:fld id="{EC4347D3-4C9A-C240-8F14-750059DFEEB0}" type="datetimeFigureOut">
               <a:rPr lang="en-US" smtClean="0"/>
-              <a:t>3/23/23</a:t>
+              <a:t>3/19/25</a:t>
             </a:fld>
             <a:endParaRPr lang="en-US"/>
           </a:p>
@@ -7613,7 +7628,7 @@
           <a:p>
             <a:fld id="{EC4347D3-4C9A-C240-8F14-750059DFEEB0}" type="datetimeFigureOut">
               <a:rPr lang="en-US" smtClean="0"/>
-              <a:t>3/23/23</a:t>
+              <a:t>3/19/25</a:t>
             </a:fld>
             <a:endParaRPr lang="en-US"/>
           </a:p>
@@ -7783,7 +7798,7 @@
           <a:p>
             <a:fld id="{EC4347D3-4C9A-C240-8F14-750059DFEEB0}" type="datetimeFigureOut">
               <a:rPr lang="en-US" smtClean="0"/>
-              <a:t>3/23/23</a:t>
+              <a:t>3/19/25</a:t>
             </a:fld>
             <a:endParaRPr lang="en-US"/>
           </a:p>
@@ -8033,7 +8048,7 @@
           <a:p>
             <a:fld id="{EC4347D3-4C9A-C240-8F14-750059DFEEB0}" type="datetimeFigureOut">
               <a:rPr lang="en-US" smtClean="0"/>
-              <a:t>3/23/23</a:t>
+              <a:t>3/19/25</a:t>
             </a:fld>
             <a:endParaRPr lang="en-US"/>
           </a:p>
@@ -8265,7 +8280,7 @@
           <a:p>
             <a:fld id="{EC4347D3-4C9A-C240-8F14-750059DFEEB0}" type="datetimeFigureOut">
               <a:rPr lang="en-US" smtClean="0"/>
-              <a:t>3/23/23</a:t>
+              <a:t>3/19/25</a:t>
             </a:fld>
             <a:endParaRPr lang="en-US"/>
           </a:p>
@@ -8651,7 +8666,7 @@
           <a:p>
             <a:fld id="{EC4347D3-4C9A-C240-8F14-750059DFEEB0}" type="datetimeFigureOut">
               <a:rPr lang="en-US" smtClean="0"/>
-              <a:t>3/23/23</a:t>
+              <a:t>3/19/25</a:t>
             </a:fld>
             <a:endParaRPr lang="en-US"/>
           </a:p>
@@ -8774,7 +8789,7 @@
           <a:p>
             <a:fld id="{EC4347D3-4C9A-C240-8F14-750059DFEEB0}" type="datetimeFigureOut">
               <a:rPr lang="en-US" smtClean="0"/>
-              <a:t>3/23/23</a:t>
+              <a:t>3/19/25</a:t>
             </a:fld>
             <a:endParaRPr lang="en-US"/>
           </a:p>
@@ -8869,7 +8884,7 @@
           <a:p>
             <a:fld id="{EC4347D3-4C9A-C240-8F14-750059DFEEB0}" type="datetimeFigureOut">
               <a:rPr lang="en-US" smtClean="0"/>
-              <a:t>3/23/23</a:t>
+              <a:t>3/19/25</a:t>
             </a:fld>
             <a:endParaRPr lang="en-US"/>
           </a:p>
@@ -9118,7 +9133,7 @@
           <a:p>
             <a:fld id="{EC4347D3-4C9A-C240-8F14-750059DFEEB0}" type="datetimeFigureOut">
               <a:rPr lang="en-US" smtClean="0"/>
-              <a:t>3/23/23</a:t>
+              <a:t>3/19/25</a:t>
             </a:fld>
             <a:endParaRPr lang="en-US"/>
           </a:p>
@@ -9403,7 +9418,7 @@
           <a:p>
             <a:fld id="{EC4347D3-4C9A-C240-8F14-750059DFEEB0}" type="datetimeFigureOut">
               <a:rPr lang="en-US" smtClean="0"/>
-              <a:t>3/23/23</a:t>
+              <a:t>3/19/25</a:t>
             </a:fld>
             <a:endParaRPr lang="en-US"/>
           </a:p>
@@ -9526,7 +9541,7 @@
           <a:noFill/>
           <a:extLst>
             <a:ext uri="{909E8E84-426E-40dd-AFC4-6F175D3DCCD1}">
-              <a14:hiddenFill xmlns="" xmlns:a14="http://schemas.microsoft.com/office/drawing/2010/main">
+              <a14:hiddenFill xmlns:a14="http://schemas.microsoft.com/office/drawing/2010/main" xmlns="">
                 <a:solidFill>
                   <a:srgbClr val="FFFFFF"/>
                 </a:solidFill>
@@ -9600,7 +9615,7 @@
               </a:ln>
               <a:extLst>
                 <a:ext uri="{91240B29-F687-4f45-9708-019B960494DF}">
-                  <a14:hiddenLine xmlns="" xmlns:a14="http://schemas.microsoft.com/office/drawing/2010/main" w="9525">
+                  <a14:hiddenLine xmlns:a14="http://schemas.microsoft.com/office/drawing/2010/main" xmlns="" w="9525">
                     <a:solidFill>
                       <a:srgbClr val="000000"/>
                     </a:solidFill>
@@ -9690,7 +9705,7 @@
               </a:ln>
               <a:extLst>
                 <a:ext uri="{91240B29-F687-4f45-9708-019B960494DF}">
-                  <a14:hiddenLine xmlns="" xmlns:a14="http://schemas.microsoft.com/office/drawing/2010/main" w="9525">
+                  <a14:hiddenLine xmlns:a14="http://schemas.microsoft.com/office/drawing/2010/main" xmlns="" w="9525">
                     <a:solidFill>
                       <a:srgbClr val="000000"/>
                     </a:solidFill>
@@ -9780,7 +9795,7 @@
               </a:ln>
               <a:extLst>
                 <a:ext uri="{91240B29-F687-4f45-9708-019B960494DF}">
-                  <a14:hiddenLine xmlns="" xmlns:a14="http://schemas.microsoft.com/office/drawing/2010/main" w="9525">
+                  <a14:hiddenLine xmlns:a14="http://schemas.microsoft.com/office/drawing/2010/main" xmlns="" w="9525">
                     <a:solidFill>
                       <a:srgbClr val="000000"/>
                     </a:solidFill>
@@ -9842,7 +9857,7 @@
               </a:ln>
               <a:extLst>
                 <a:ext uri="{91240B29-F687-4f45-9708-019B960494DF}">
-                  <a14:hiddenLine xmlns="" xmlns:a14="http://schemas.microsoft.com/office/drawing/2010/main" w="9525">
+                  <a14:hiddenLine xmlns:a14="http://schemas.microsoft.com/office/drawing/2010/main" xmlns="" w="9525">
                     <a:solidFill>
                       <a:srgbClr val="000000"/>
                     </a:solidFill>
@@ -9932,7 +9947,7 @@
               </a:ln>
               <a:extLst>
                 <a:ext uri="{91240B29-F687-4f45-9708-019B960494DF}">
-                  <a14:hiddenLine xmlns="" xmlns:a14="http://schemas.microsoft.com/office/drawing/2010/main" w="9525">
+                  <a14:hiddenLine xmlns:a14="http://schemas.microsoft.com/office/drawing/2010/main" xmlns="" w="9525">
                     <a:solidFill>
                       <a:srgbClr val="000000"/>
                     </a:solidFill>
@@ -9994,7 +10009,7 @@
               </a:ln>
               <a:extLst>
                 <a:ext uri="{91240B29-F687-4f45-9708-019B960494DF}">
-                  <a14:hiddenLine xmlns="" xmlns:a14="http://schemas.microsoft.com/office/drawing/2010/main" w="9525">
+                  <a14:hiddenLine xmlns:a14="http://schemas.microsoft.com/office/drawing/2010/main" xmlns="" w="9525">
                     <a:solidFill>
                       <a:srgbClr val="000000"/>
                     </a:solidFill>
@@ -10056,7 +10071,7 @@
               </a:ln>
               <a:extLst>
                 <a:ext uri="{91240B29-F687-4f45-9708-019B960494DF}">
-                  <a14:hiddenLine xmlns="" xmlns:a14="http://schemas.microsoft.com/office/drawing/2010/main" w="9525">
+                  <a14:hiddenLine xmlns:a14="http://schemas.microsoft.com/office/drawing/2010/main" xmlns="" w="9525">
                     <a:solidFill>
                       <a:srgbClr val="000000"/>
                     </a:solidFill>
@@ -10146,7 +10161,7 @@
               </a:ln>
               <a:extLst>
                 <a:ext uri="{91240B29-F687-4f45-9708-019B960494DF}">
-                  <a14:hiddenLine xmlns="" xmlns:a14="http://schemas.microsoft.com/office/drawing/2010/main" w="9525">
+                  <a14:hiddenLine xmlns:a14="http://schemas.microsoft.com/office/drawing/2010/main" xmlns="" w="9525">
                     <a:solidFill>
                       <a:srgbClr val="000000"/>
                     </a:solidFill>
@@ -10236,7 +10251,7 @@
               </a:ln>
               <a:extLst>
                 <a:ext uri="{91240B29-F687-4f45-9708-019B960494DF}">
-                  <a14:hiddenLine xmlns="" xmlns:a14="http://schemas.microsoft.com/office/drawing/2010/main" w="9525">
+                  <a14:hiddenLine xmlns:a14="http://schemas.microsoft.com/office/drawing/2010/main" xmlns="" w="9525">
                     <a:solidFill>
                       <a:srgbClr val="000000"/>
                     </a:solidFill>
@@ -10298,7 +10313,7 @@
               </a:ln>
               <a:extLst>
                 <a:ext uri="{91240B29-F687-4f45-9708-019B960494DF}">
-                  <a14:hiddenLine xmlns="" xmlns:a14="http://schemas.microsoft.com/office/drawing/2010/main" w="9525">
+                  <a14:hiddenLine xmlns:a14="http://schemas.microsoft.com/office/drawing/2010/main" xmlns="" w="9525">
                     <a:solidFill>
                       <a:srgbClr val="000000"/>
                     </a:solidFill>
@@ -10408,7 +10423,7 @@
               </a:ln>
               <a:extLst>
                 <a:ext uri="{91240B29-F687-4f45-9708-019B960494DF}">
-                  <a14:hiddenLine xmlns="" xmlns:a14="http://schemas.microsoft.com/office/drawing/2010/main" w="9525">
+                  <a14:hiddenLine xmlns:a14="http://schemas.microsoft.com/office/drawing/2010/main" xmlns="" w="9525">
                     <a:solidFill>
                       <a:srgbClr val="000000"/>
                     </a:solidFill>
@@ -10492,7 +10507,7 @@
               </a:ln>
               <a:extLst>
                 <a:ext uri="{91240B29-F687-4f45-9708-019B960494DF}">
-                  <a14:hiddenLine xmlns="" xmlns:a14="http://schemas.microsoft.com/office/drawing/2010/main" w="9525">
+                  <a14:hiddenLine xmlns:a14="http://schemas.microsoft.com/office/drawing/2010/main" xmlns="" w="9525">
                     <a:solidFill>
                       <a:srgbClr val="000000"/>
                     </a:solidFill>
@@ -10554,7 +10569,7 @@
               </a:ln>
               <a:extLst>
                 <a:ext uri="{91240B29-F687-4f45-9708-019B960494DF}">
-                  <a14:hiddenLine xmlns="" xmlns:a14="http://schemas.microsoft.com/office/drawing/2010/main" w="9525">
+                  <a14:hiddenLine xmlns:a14="http://schemas.microsoft.com/office/drawing/2010/main" xmlns="" w="9525">
                     <a:solidFill>
                       <a:srgbClr val="000000"/>
                     </a:solidFill>
@@ -10616,7 +10631,7 @@
               </a:ln>
               <a:extLst>
                 <a:ext uri="{91240B29-F687-4f45-9708-019B960494DF}">
-                  <a14:hiddenLine xmlns="" xmlns:a14="http://schemas.microsoft.com/office/drawing/2010/main" w="9525">
+                  <a14:hiddenLine xmlns:a14="http://schemas.microsoft.com/office/drawing/2010/main" xmlns="" w="9525">
                     <a:solidFill>
                       <a:srgbClr val="000000"/>
                     </a:solidFill>
@@ -10706,7 +10721,7 @@
               </a:ln>
               <a:extLst>
                 <a:ext uri="{91240B29-F687-4f45-9708-019B960494DF}">
-                  <a14:hiddenLine xmlns="" xmlns:a14="http://schemas.microsoft.com/office/drawing/2010/main" w="9525">
+                  <a14:hiddenLine xmlns:a14="http://schemas.microsoft.com/office/drawing/2010/main" xmlns="" w="9525">
                     <a:solidFill>
                       <a:srgbClr val="000000"/>
                     </a:solidFill>
@@ -10740,7 +10755,7 @@
               </a:ln>
               <a:extLst>
                 <a:ext uri="{91240B29-F687-4f45-9708-019B960494DF}">
-                  <a14:hiddenLine xmlns="" xmlns:a14="http://schemas.microsoft.com/office/drawing/2010/main" w="9525">
+                  <a14:hiddenLine xmlns:a14="http://schemas.microsoft.com/office/drawing/2010/main" xmlns="" w="9525">
                     <a:solidFill>
                       <a:srgbClr val="000000"/>
                     </a:solidFill>
@@ -10805,7 +10820,7 @@
               </a:ln>
               <a:extLst>
                 <a:ext uri="{91240B29-F687-4f45-9708-019B960494DF}">
-                  <a14:hiddenLine xmlns="" xmlns:a14="http://schemas.microsoft.com/office/drawing/2010/main" w="9525">
+                  <a14:hiddenLine xmlns:a14="http://schemas.microsoft.com/office/drawing/2010/main" xmlns="" w="9525">
                     <a:solidFill>
                       <a:srgbClr val="000000"/>
                     </a:solidFill>
@@ -10895,7 +10910,7 @@
               </a:ln>
               <a:extLst>
                 <a:ext uri="{91240B29-F687-4f45-9708-019B960494DF}">
-                  <a14:hiddenLine xmlns="" xmlns:a14="http://schemas.microsoft.com/office/drawing/2010/main" w="9525">
+                  <a14:hiddenLine xmlns:a14="http://schemas.microsoft.com/office/drawing/2010/main" xmlns="" w="9525">
                     <a:solidFill>
                       <a:srgbClr val="000000"/>
                     </a:solidFill>
@@ -10957,7 +10972,7 @@
               </a:ln>
               <a:extLst>
                 <a:ext uri="{91240B29-F687-4f45-9708-019B960494DF}">
-                  <a14:hiddenLine xmlns="" xmlns:a14="http://schemas.microsoft.com/office/drawing/2010/main" w="9525">
+                  <a14:hiddenLine xmlns:a14="http://schemas.microsoft.com/office/drawing/2010/main" xmlns="" w="9525">
                     <a:solidFill>
                       <a:srgbClr val="000000"/>
                     </a:solidFill>
@@ -11047,7 +11062,7 @@
               </a:ln>
               <a:extLst>
                 <a:ext uri="{91240B29-F687-4f45-9708-019B960494DF}">
-                  <a14:hiddenLine xmlns="" xmlns:a14="http://schemas.microsoft.com/office/drawing/2010/main" w="9525">
+                  <a14:hiddenLine xmlns:a14="http://schemas.microsoft.com/office/drawing/2010/main" xmlns="" w="9525">
                     <a:solidFill>
                       <a:srgbClr val="000000"/>
                     </a:solidFill>
@@ -11112,7 +11127,7 @@
               </a:ln>
               <a:extLst>
                 <a:ext uri="{91240B29-F687-4f45-9708-019B960494DF}">
-                  <a14:hiddenLine xmlns="" xmlns:a14="http://schemas.microsoft.com/office/drawing/2010/main" w="9525">
+                  <a14:hiddenLine xmlns:a14="http://schemas.microsoft.com/office/drawing/2010/main" xmlns="" w="9525">
                     <a:solidFill>
                       <a:srgbClr val="000000"/>
                     </a:solidFill>
@@ -11174,7 +11189,7 @@
               </a:ln>
               <a:extLst>
                 <a:ext uri="{91240B29-F687-4f45-9708-019B960494DF}">
-                  <a14:hiddenLine xmlns="" xmlns:a14="http://schemas.microsoft.com/office/drawing/2010/main" w="9525">
+                  <a14:hiddenLine xmlns:a14="http://schemas.microsoft.com/office/drawing/2010/main" xmlns="" w="9525">
                     <a:solidFill>
                       <a:srgbClr val="000000"/>
                     </a:solidFill>
@@ -11264,7 +11279,7 @@
               </a:ln>
               <a:extLst>
                 <a:ext uri="{91240B29-F687-4f45-9708-019B960494DF}">
-                  <a14:hiddenLine xmlns="" xmlns:a14="http://schemas.microsoft.com/office/drawing/2010/main" w="9525">
+                  <a14:hiddenLine xmlns:a14="http://schemas.microsoft.com/office/drawing/2010/main" xmlns="" w="9525">
                     <a:solidFill>
                       <a:srgbClr val="000000"/>
                     </a:solidFill>
@@ -11354,7 +11369,7 @@
               </a:ln>
               <a:extLst>
                 <a:ext uri="{91240B29-F687-4f45-9708-019B960494DF}">
-                  <a14:hiddenLine xmlns="" xmlns:a14="http://schemas.microsoft.com/office/drawing/2010/main" w="9525">
+                  <a14:hiddenLine xmlns:a14="http://schemas.microsoft.com/office/drawing/2010/main" xmlns="" w="9525">
                     <a:solidFill>
                       <a:srgbClr val="000000"/>
                     </a:solidFill>
@@ -11419,7 +11434,7 @@
               </a:ln>
               <a:extLst>
                 <a:ext uri="{91240B29-F687-4f45-9708-019B960494DF}">
-                  <a14:hiddenLine xmlns="" xmlns:a14="http://schemas.microsoft.com/office/drawing/2010/main" w="9525">
+                  <a14:hiddenLine xmlns:a14="http://schemas.microsoft.com/office/drawing/2010/main" xmlns="" w="9525">
                     <a:solidFill>
                       <a:srgbClr val="000000"/>
                     </a:solidFill>
@@ -11539,7 +11554,7 @@
               </a:ln>
               <a:extLst>
                 <a:ext uri="{91240B29-F687-4f45-9708-019B960494DF}">
-                  <a14:hiddenLine xmlns="" xmlns:a14="http://schemas.microsoft.com/office/drawing/2010/main" w="9525">
+                  <a14:hiddenLine xmlns:a14="http://schemas.microsoft.com/office/drawing/2010/main" xmlns="" w="9525">
                     <a:solidFill>
                       <a:srgbClr val="000000"/>
                     </a:solidFill>
@@ -11620,7 +11635,7 @@
               </a:ln>
               <a:extLst>
                 <a:ext uri="{91240B29-F687-4f45-9708-019B960494DF}">
-                  <a14:hiddenLine xmlns="" xmlns:a14="http://schemas.microsoft.com/office/drawing/2010/main" w="9525">
+                  <a14:hiddenLine xmlns:a14="http://schemas.microsoft.com/office/drawing/2010/main" xmlns="" w="9525">
                     <a:solidFill>
                       <a:srgbClr val="000000"/>
                     </a:solidFill>
@@ -11735,7 +11750,7 @@
               </a:ln>
               <a:extLst>
                 <a:ext uri="{91240B29-F687-4f45-9708-019B960494DF}">
-                  <a14:hiddenLine xmlns="" xmlns:a14="http://schemas.microsoft.com/office/drawing/2010/main" w="9525">
+                  <a14:hiddenLine xmlns:a14="http://schemas.microsoft.com/office/drawing/2010/main" xmlns="" w="9525">
                     <a:solidFill>
                       <a:srgbClr val="000000"/>
                     </a:solidFill>
@@ -11825,7 +11840,7 @@
               </a:ln>
               <a:extLst>
                 <a:ext uri="{91240B29-F687-4f45-9708-019B960494DF}">
-                  <a14:hiddenLine xmlns="" xmlns:a14="http://schemas.microsoft.com/office/drawing/2010/main" w="9525">
+                  <a14:hiddenLine xmlns:a14="http://schemas.microsoft.com/office/drawing/2010/main" xmlns="" w="9525">
                     <a:solidFill>
                       <a:srgbClr val="000000"/>
                     </a:solidFill>
@@ -11890,7 +11905,7 @@
               </a:ln>
               <a:extLst>
                 <a:ext uri="{91240B29-F687-4f45-9708-019B960494DF}">
-                  <a14:hiddenLine xmlns="" xmlns:a14="http://schemas.microsoft.com/office/drawing/2010/main" w="9525">
+                  <a14:hiddenLine xmlns:a14="http://schemas.microsoft.com/office/drawing/2010/main" xmlns="" w="9525">
                     <a:solidFill>
                       <a:srgbClr val="000000"/>
                     </a:solidFill>
@@ -11980,7 +11995,7 @@
               </a:ln>
               <a:extLst>
                 <a:ext uri="{91240B29-F687-4f45-9708-019B960494DF}">
-                  <a14:hiddenLine xmlns="" xmlns:a14="http://schemas.microsoft.com/office/drawing/2010/main" w="9525">
+                  <a14:hiddenLine xmlns:a14="http://schemas.microsoft.com/office/drawing/2010/main" xmlns="" w="9525">
                     <a:solidFill>
                       <a:srgbClr val="000000"/>
                     </a:solidFill>
@@ -12048,7 +12063,7 @@
               </a:ln>
               <a:extLst>
                 <a:ext uri="{91240B29-F687-4f45-9708-019B960494DF}">
-                  <a14:hiddenLine xmlns="" xmlns:a14="http://schemas.microsoft.com/office/drawing/2010/main" w="9525">
+                  <a14:hiddenLine xmlns:a14="http://schemas.microsoft.com/office/drawing/2010/main" xmlns="" w="9525">
                     <a:solidFill>
                       <a:srgbClr val="000000"/>
                     </a:solidFill>
@@ -12138,7 +12153,7 @@
               </a:ln>
               <a:extLst>
                 <a:ext uri="{91240B29-F687-4f45-9708-019B960494DF}">
-                  <a14:hiddenLine xmlns="" xmlns:a14="http://schemas.microsoft.com/office/drawing/2010/main" w="9525">
+                  <a14:hiddenLine xmlns:a14="http://schemas.microsoft.com/office/drawing/2010/main" xmlns="" w="9525">
                     <a:solidFill>
                       <a:srgbClr val="000000"/>
                     </a:solidFill>
@@ -12206,7 +12221,7 @@
               </a:ln>
               <a:extLst>
                 <a:ext uri="{91240B29-F687-4f45-9708-019B960494DF}">
-                  <a14:hiddenLine xmlns="" xmlns:a14="http://schemas.microsoft.com/office/drawing/2010/main" w="9525">
+                  <a14:hiddenLine xmlns:a14="http://schemas.microsoft.com/office/drawing/2010/main" xmlns="" w="9525">
                     <a:solidFill>
                       <a:srgbClr val="000000"/>
                     </a:solidFill>
@@ -12296,7 +12311,7 @@
               </a:ln>
               <a:extLst>
                 <a:ext uri="{91240B29-F687-4f45-9708-019B960494DF}">
-                  <a14:hiddenLine xmlns="" xmlns:a14="http://schemas.microsoft.com/office/drawing/2010/main" w="9525">
+                  <a14:hiddenLine xmlns:a14="http://schemas.microsoft.com/office/drawing/2010/main" xmlns="" w="9525">
                     <a:solidFill>
                       <a:srgbClr val="000000"/>
                     </a:solidFill>
@@ -12330,7 +12345,7 @@
               </a:ln>
               <a:extLst>
                 <a:ext uri="{91240B29-F687-4f45-9708-019B960494DF}">
-                  <a14:hiddenLine xmlns="" xmlns:a14="http://schemas.microsoft.com/office/drawing/2010/main" w="9525">
+                  <a14:hiddenLine xmlns:a14="http://schemas.microsoft.com/office/drawing/2010/main" xmlns="" w="9525">
                     <a:solidFill>
                       <a:srgbClr val="000000"/>
                     </a:solidFill>
@@ -12470,7 +12485,7 @@
           <a:p>
             <a:fld id="{EC4347D3-4C9A-C240-8F14-750059DFEEB0}" type="datetimeFigureOut">
               <a:rPr lang="en-US" smtClean="0"/>
-              <a:t>3/23/23</a:t>
+              <a:t>3/19/25</a:t>
             </a:fld>
             <a:endParaRPr lang="en-US"/>
           </a:p>
@@ -12985,6 +13000,1317 @@
 </p:sld>
 </file>
 
+<file path=ppt/slides/slide10.xml><?xml version="1.0" encoding="utf-8"?>
+<p:sld xmlns:a="http://schemas.openxmlformats.org/drawingml/2006/main" xmlns:r="http://schemas.openxmlformats.org/officeDocument/2006/relationships" xmlns:p="http://schemas.openxmlformats.org/presentationml/2006/main">
+  <p:cSld>
+    <p:spTree>
+      <p:nvGrpSpPr>
+        <p:cNvPr id="1" name=""/>
+        <p:cNvGrpSpPr/>
+        <p:nvPr/>
+      </p:nvGrpSpPr>
+      <p:grpSpPr>
+        <a:xfrm>
+          <a:off x="0" y="0"/>
+          <a:ext cx="0" cy="0"/>
+          <a:chOff x="0" y="0"/>
+          <a:chExt cx="0" cy="0"/>
+        </a:xfrm>
+      </p:grpSpPr>
+      <p:sp>
+        <p:nvSpPr>
+          <p:cNvPr id="6" name="Title 1">
+            <a:extLst>
+              <a:ext uri="{FF2B5EF4-FFF2-40B4-BE49-F238E27FC236}">
+                <a16:creationId xmlns:a16="http://schemas.microsoft.com/office/drawing/2014/main" id="{CEDA7E1F-EA10-664E-B135-4A53E08CED96}"/>
+              </a:ext>
+            </a:extLst>
+          </p:cNvPr>
+          <p:cNvSpPr>
+            <a:spLocks noGrp="1"/>
+          </p:cNvSpPr>
+          <p:nvPr>
+            <p:ph type="title"/>
+          </p:nvPr>
+        </p:nvSpPr>
+        <p:spPr>
+          <a:xfrm>
+            <a:off x="1141412" y="228903"/>
+            <a:ext cx="9905998" cy="860425"/>
+          </a:xfrm>
+        </p:spPr>
+        <p:txBody>
+          <a:bodyPr/>
+          <a:lstStyle/>
+          <a:p>
+            <a:pPr algn="ctr"/>
+            <a:r>
+              <a:rPr lang="en-US" dirty="0" err="1"/>
+              <a:t>Approx</a:t>
+            </a:r>
+            <a:r>
+              <a:rPr lang="en-US" dirty="0"/>
+              <a:t>-Vert-Cover: Analysis</a:t>
+            </a:r>
+          </a:p>
+        </p:txBody>
+      </p:sp>
+      <p:sp>
+        <p:nvSpPr>
+          <p:cNvPr id="8" name="TextBox 7">
+            <a:extLst>
+              <a:ext uri="{FF2B5EF4-FFF2-40B4-BE49-F238E27FC236}">
+                <a16:creationId xmlns:a16="http://schemas.microsoft.com/office/drawing/2014/main" id="{2433B4B9-DF60-D14D-B949-7C3D8B207D53}"/>
+              </a:ext>
+            </a:extLst>
+          </p:cNvPr>
+          <p:cNvSpPr txBox="1"/>
+          <p:nvPr/>
+        </p:nvSpPr>
+        <p:spPr>
+          <a:xfrm>
+            <a:off x="7867792" y="1797627"/>
+            <a:ext cx="3179618" cy="369332"/>
+          </a:xfrm>
+          <a:prstGeom prst="rect">
+            <a:avLst/>
+          </a:prstGeom>
+          <a:noFill/>
+        </p:spPr>
+        <p:txBody>
+          <a:bodyPr wrap="square" rtlCol="0">
+            <a:spAutoFit/>
+          </a:bodyPr>
+          <a:lstStyle/>
+          <a:p>
+            <a:r>
+              <a:rPr lang="en-US" dirty="0"/>
+              <a:t>What is the approx. ratio??</a:t>
+            </a:r>
+          </a:p>
+        </p:txBody>
+      </p:sp>
+      <p:pic>
+        <p:nvPicPr>
+          <p:cNvPr id="5" name="Picture 4">
+            <a:extLst>
+              <a:ext uri="{FF2B5EF4-FFF2-40B4-BE49-F238E27FC236}">
+                <a16:creationId xmlns:a16="http://schemas.microsoft.com/office/drawing/2014/main" id="{1CE34760-0177-0044-B196-7F86B3C28D5D}"/>
+              </a:ext>
+            </a:extLst>
+          </p:cNvPr>
+          <p:cNvPicPr>
+            <a:picLocks noChangeAspect="1"/>
+          </p:cNvPicPr>
+          <p:nvPr/>
+        </p:nvPicPr>
+        <p:blipFill>
+          <a:blip r:embed="rId2"/>
+          <a:stretch>
+            <a:fillRect/>
+          </a:stretch>
+        </p:blipFill>
+        <p:spPr>
+          <a:xfrm>
+            <a:off x="2473613" y="1089328"/>
+            <a:ext cx="4249305" cy="5643346"/>
+          </a:xfrm>
+          <a:prstGeom prst="rect">
+            <a:avLst/>
+          </a:prstGeom>
+        </p:spPr>
+      </p:pic>
+    </p:spTree>
+    <p:extLst>
+      <p:ext uri="{BB962C8B-B14F-4D97-AF65-F5344CB8AC3E}">
+        <p14:creationId xmlns:p14="http://schemas.microsoft.com/office/powerpoint/2010/main" val="4111122879"/>
+      </p:ext>
+    </p:extLst>
+  </p:cSld>
+  <p:clrMapOvr>
+    <a:masterClrMapping/>
+  </p:clrMapOvr>
+</p:sld>
+</file>
+
+<file path=ppt/slides/slide11.xml><?xml version="1.0" encoding="utf-8"?>
+<p:sld xmlns:a="http://schemas.openxmlformats.org/drawingml/2006/main" xmlns:r="http://schemas.openxmlformats.org/officeDocument/2006/relationships" xmlns:p="http://schemas.openxmlformats.org/presentationml/2006/main">
+  <p:cSld>
+    <p:spTree>
+      <p:nvGrpSpPr>
+        <p:cNvPr id="1" name=""/>
+        <p:cNvGrpSpPr/>
+        <p:nvPr/>
+      </p:nvGrpSpPr>
+      <p:grpSpPr>
+        <a:xfrm>
+          <a:off x="0" y="0"/>
+          <a:ext cx="0" cy="0"/>
+          <a:chOff x="0" y="0"/>
+          <a:chExt cx="0" cy="0"/>
+        </a:xfrm>
+      </p:grpSpPr>
+      <p:sp>
+        <p:nvSpPr>
+          <p:cNvPr id="2" name="Title 1">
+            <a:extLst>
+              <a:ext uri="{FF2B5EF4-FFF2-40B4-BE49-F238E27FC236}">
+                <a16:creationId xmlns:a16="http://schemas.microsoft.com/office/drawing/2014/main" id="{87719C56-21DC-0A40-AA49-9AF4AF4C92DA}"/>
+              </a:ext>
+            </a:extLst>
+          </p:cNvPr>
+          <p:cNvSpPr>
+            <a:spLocks noGrp="1"/>
+          </p:cNvSpPr>
+          <p:nvPr>
+            <p:ph type="title"/>
+          </p:nvPr>
+        </p:nvSpPr>
+        <p:spPr>
+          <a:xfrm>
+            <a:off x="1141411" y="1860330"/>
+            <a:ext cx="9906000" cy="2175149"/>
+          </a:xfrm>
+        </p:spPr>
+        <p:txBody>
+          <a:bodyPr/>
+          <a:lstStyle/>
+          <a:p>
+            <a:pPr algn="ctr"/>
+            <a:r>
+              <a:rPr lang="en-US" dirty="0"/>
+              <a:t>Traveling Salesperson</a:t>
+            </a:r>
+          </a:p>
+        </p:txBody>
+      </p:sp>
+    </p:spTree>
+    <p:extLst>
+      <p:ext uri="{BB962C8B-B14F-4D97-AF65-F5344CB8AC3E}">
+        <p14:creationId xmlns:p14="http://schemas.microsoft.com/office/powerpoint/2010/main" val="716826074"/>
+      </p:ext>
+    </p:extLst>
+  </p:cSld>
+  <p:clrMapOvr>
+    <a:masterClrMapping/>
+  </p:clrMapOvr>
+</p:sld>
+</file>
+
+<file path=ppt/slides/slide12.xml><?xml version="1.0" encoding="utf-8"?>
+<p:sld xmlns:a="http://schemas.openxmlformats.org/drawingml/2006/main" xmlns:r="http://schemas.openxmlformats.org/officeDocument/2006/relationships" xmlns:p="http://schemas.openxmlformats.org/presentationml/2006/main">
+  <p:cSld>
+    <p:spTree>
+      <p:nvGrpSpPr>
+        <p:cNvPr id="1" name=""/>
+        <p:cNvGrpSpPr/>
+        <p:nvPr/>
+      </p:nvGrpSpPr>
+      <p:grpSpPr>
+        <a:xfrm>
+          <a:off x="0" y="0"/>
+          <a:ext cx="0" cy="0"/>
+          <a:chOff x="0" y="0"/>
+          <a:chExt cx="0" cy="0"/>
+        </a:xfrm>
+      </p:grpSpPr>
+      <p:sp>
+        <p:nvSpPr>
+          <p:cNvPr id="6" name="Title 1">
+            <a:extLst>
+              <a:ext uri="{FF2B5EF4-FFF2-40B4-BE49-F238E27FC236}">
+                <a16:creationId xmlns:a16="http://schemas.microsoft.com/office/drawing/2014/main" id="{CEDA7E1F-EA10-664E-B135-4A53E08CED96}"/>
+              </a:ext>
+            </a:extLst>
+          </p:cNvPr>
+          <p:cNvSpPr>
+            <a:spLocks noGrp="1"/>
+          </p:cNvSpPr>
+          <p:nvPr>
+            <p:ph type="title"/>
+          </p:nvPr>
+        </p:nvSpPr>
+        <p:spPr>
+          <a:xfrm>
+            <a:off x="1141412" y="228903"/>
+            <a:ext cx="9905998" cy="860425"/>
+          </a:xfrm>
+        </p:spPr>
+        <p:txBody>
+          <a:bodyPr/>
+          <a:lstStyle/>
+          <a:p>
+            <a:pPr algn="ctr"/>
+            <a:r>
+              <a:rPr lang="en-US" dirty="0"/>
+              <a:t>Recall Traveling </a:t>
+            </a:r>
+            <a:r>
+              <a:rPr lang="en-US" dirty="0" err="1"/>
+              <a:t>SalesPerson</a:t>
+            </a:r>
+            <a:r>
+              <a:rPr lang="en-US" dirty="0"/>
+              <a:t> Problem</a:t>
+            </a:r>
+          </a:p>
+        </p:txBody>
+      </p:sp>
+      <p:sp>
+        <p:nvSpPr>
+          <p:cNvPr id="2" name="TextBox 1">
+            <a:extLst>
+              <a:ext uri="{FF2B5EF4-FFF2-40B4-BE49-F238E27FC236}">
+                <a16:creationId xmlns:a16="http://schemas.microsoft.com/office/drawing/2014/main" id="{E5D1DC23-009C-4345-AACE-883EA6E42F99}"/>
+              </a:ext>
+            </a:extLst>
+          </p:cNvPr>
+          <p:cNvSpPr txBox="1"/>
+          <p:nvPr/>
+        </p:nvSpPr>
+        <p:spPr>
+          <a:xfrm>
+            <a:off x="1465118" y="2421082"/>
+            <a:ext cx="3179618" cy="646331"/>
+          </a:xfrm>
+          <a:prstGeom prst="rect">
+            <a:avLst/>
+          </a:prstGeom>
+          <a:noFill/>
+        </p:spPr>
+        <p:txBody>
+          <a:bodyPr wrap="square" rtlCol="0">
+            <a:spAutoFit/>
+          </a:bodyPr>
+          <a:lstStyle/>
+          <a:p>
+            <a:r>
+              <a:rPr lang="en-US" dirty="0"/>
+              <a:t>How an example of the TSP problem…</a:t>
+            </a:r>
+          </a:p>
+        </p:txBody>
+      </p:sp>
+      <p:sp>
+        <p:nvSpPr>
+          <p:cNvPr id="4" name="TextBox 3">
+            <a:extLst>
+              <a:ext uri="{FF2B5EF4-FFF2-40B4-BE49-F238E27FC236}">
+                <a16:creationId xmlns:a16="http://schemas.microsoft.com/office/drawing/2014/main" id="{80935D60-A36B-8842-BA0D-602EF49A20D2}"/>
+              </a:ext>
+            </a:extLst>
+          </p:cNvPr>
+          <p:cNvSpPr txBox="1"/>
+          <p:nvPr/>
+        </p:nvSpPr>
+        <p:spPr>
+          <a:xfrm>
+            <a:off x="1465118" y="5004954"/>
+            <a:ext cx="3179618" cy="646331"/>
+          </a:xfrm>
+          <a:prstGeom prst="rect">
+            <a:avLst/>
+          </a:prstGeom>
+          <a:noFill/>
+        </p:spPr>
+        <p:txBody>
+          <a:bodyPr wrap="square" rtlCol="0">
+            <a:spAutoFit/>
+          </a:bodyPr>
+          <a:lstStyle/>
+          <a:p>
+            <a:r>
+              <a:rPr lang="en-US" dirty="0"/>
+              <a:t>Include triangle inequality assumption</a:t>
+            </a:r>
+          </a:p>
+        </p:txBody>
+      </p:sp>
+      <p:pic>
+        <p:nvPicPr>
+          <p:cNvPr id="5" name="Picture 4">
+            <a:extLst>
+              <a:ext uri="{FF2B5EF4-FFF2-40B4-BE49-F238E27FC236}">
+                <a16:creationId xmlns:a16="http://schemas.microsoft.com/office/drawing/2014/main" id="{7766F34D-1C02-7043-AF7F-9657C0FCAB01}"/>
+              </a:ext>
+            </a:extLst>
+          </p:cNvPr>
+          <p:cNvPicPr>
+            <a:picLocks noChangeAspect="1"/>
+          </p:cNvPicPr>
+          <p:nvPr/>
+        </p:nvPicPr>
+        <p:blipFill>
+          <a:blip r:embed="rId2"/>
+          <a:stretch>
+            <a:fillRect/>
+          </a:stretch>
+        </p:blipFill>
+        <p:spPr>
+          <a:xfrm>
+            <a:off x="5406158" y="1214019"/>
+            <a:ext cx="5352493" cy="5373817"/>
+          </a:xfrm>
+          <a:prstGeom prst="rect">
+            <a:avLst/>
+          </a:prstGeom>
+        </p:spPr>
+      </p:pic>
+    </p:spTree>
+    <p:extLst>
+      <p:ext uri="{BB962C8B-B14F-4D97-AF65-F5344CB8AC3E}">
+        <p14:creationId xmlns:p14="http://schemas.microsoft.com/office/powerpoint/2010/main" val="3380446973"/>
+      </p:ext>
+    </p:extLst>
+  </p:cSld>
+  <p:clrMapOvr>
+    <a:masterClrMapping/>
+  </p:clrMapOvr>
+</p:sld>
+</file>
+
+<file path=ppt/slides/slide13.xml><?xml version="1.0" encoding="utf-8"?>
+<p:sld xmlns:a="http://schemas.openxmlformats.org/drawingml/2006/main" xmlns:r="http://schemas.openxmlformats.org/officeDocument/2006/relationships" xmlns:p="http://schemas.openxmlformats.org/presentationml/2006/main">
+  <p:cSld>
+    <p:spTree>
+      <p:nvGrpSpPr>
+        <p:cNvPr id="1" name=""/>
+        <p:cNvGrpSpPr/>
+        <p:nvPr/>
+      </p:nvGrpSpPr>
+      <p:grpSpPr>
+        <a:xfrm>
+          <a:off x="0" y="0"/>
+          <a:ext cx="0" cy="0"/>
+          <a:chOff x="0" y="0"/>
+          <a:chExt cx="0" cy="0"/>
+        </a:xfrm>
+      </p:grpSpPr>
+      <p:sp>
+        <p:nvSpPr>
+          <p:cNvPr id="6" name="Title 1">
+            <a:extLst>
+              <a:ext uri="{FF2B5EF4-FFF2-40B4-BE49-F238E27FC236}">
+                <a16:creationId xmlns:a16="http://schemas.microsoft.com/office/drawing/2014/main" id="{CEDA7E1F-EA10-664E-B135-4A53E08CED96}"/>
+              </a:ext>
+            </a:extLst>
+          </p:cNvPr>
+          <p:cNvSpPr>
+            <a:spLocks noGrp="1"/>
+          </p:cNvSpPr>
+          <p:nvPr>
+            <p:ph type="title"/>
+          </p:nvPr>
+        </p:nvSpPr>
+        <p:spPr>
+          <a:xfrm>
+            <a:off x="1141412" y="228903"/>
+            <a:ext cx="9905998" cy="860425"/>
+          </a:xfrm>
+        </p:spPr>
+        <p:txBody>
+          <a:bodyPr/>
+          <a:lstStyle/>
+          <a:p>
+            <a:pPr algn="ctr"/>
+            <a:r>
+              <a:rPr lang="en-US" dirty="0"/>
+              <a:t>Approximation for TSP</a:t>
+            </a:r>
+          </a:p>
+        </p:txBody>
+      </p:sp>
+      <p:sp>
+        <p:nvSpPr>
+          <p:cNvPr id="2" name="TextBox 1">
+            <a:extLst>
+              <a:ext uri="{FF2B5EF4-FFF2-40B4-BE49-F238E27FC236}">
+                <a16:creationId xmlns:a16="http://schemas.microsoft.com/office/drawing/2014/main" id="{E5D1DC23-009C-4345-AACE-883EA6E42F99}"/>
+              </a:ext>
+            </a:extLst>
+          </p:cNvPr>
+          <p:cNvSpPr txBox="1"/>
+          <p:nvPr/>
+        </p:nvSpPr>
+        <p:spPr>
+          <a:xfrm>
+            <a:off x="1141412" y="1309255"/>
+            <a:ext cx="3179618" cy="369332"/>
+          </a:xfrm>
+          <a:prstGeom prst="rect">
+            <a:avLst/>
+          </a:prstGeom>
+          <a:noFill/>
+        </p:spPr>
+        <p:txBody>
+          <a:bodyPr wrap="square" rtlCol="0">
+            <a:spAutoFit/>
+          </a:bodyPr>
+          <a:lstStyle/>
+          <a:p>
+            <a:r>
+              <a:rPr lang="en-US" dirty="0"/>
+              <a:t>Text Box</a:t>
+            </a:r>
+          </a:p>
+        </p:txBody>
+      </p:sp>
+      <p:pic>
+        <p:nvPicPr>
+          <p:cNvPr id="7" name="Picture 6">
+            <a:extLst>
+              <a:ext uri="{FF2B5EF4-FFF2-40B4-BE49-F238E27FC236}">
+                <a16:creationId xmlns:a16="http://schemas.microsoft.com/office/drawing/2014/main" id="{0C2A4078-E765-BD49-8ED9-15652B067F00}"/>
+              </a:ext>
+            </a:extLst>
+          </p:cNvPr>
+          <p:cNvPicPr>
+            <a:picLocks noChangeAspect="1"/>
+          </p:cNvPicPr>
+          <p:nvPr/>
+        </p:nvPicPr>
+        <p:blipFill>
+          <a:blip r:embed="rId2"/>
+          <a:stretch>
+            <a:fillRect/>
+          </a:stretch>
+        </p:blipFill>
+        <p:spPr>
+          <a:xfrm>
+            <a:off x="544945" y="1999095"/>
+            <a:ext cx="5531356" cy="3549650"/>
+          </a:xfrm>
+          <a:prstGeom prst="rect">
+            <a:avLst/>
+          </a:prstGeom>
+        </p:spPr>
+      </p:pic>
+      <p:pic>
+        <p:nvPicPr>
+          <p:cNvPr id="9" name="Picture 8">
+            <a:extLst>
+              <a:ext uri="{FF2B5EF4-FFF2-40B4-BE49-F238E27FC236}">
+                <a16:creationId xmlns:a16="http://schemas.microsoft.com/office/drawing/2014/main" id="{84B26E01-8F8A-4642-BAC5-0B604E424E2C}"/>
+              </a:ext>
+            </a:extLst>
+          </p:cNvPr>
+          <p:cNvPicPr>
+            <a:picLocks noChangeAspect="1"/>
+          </p:cNvPicPr>
+          <p:nvPr/>
+        </p:nvPicPr>
+        <p:blipFill>
+          <a:blip r:embed="rId3"/>
+          <a:stretch>
+            <a:fillRect/>
+          </a:stretch>
+        </p:blipFill>
+        <p:spPr>
+          <a:xfrm>
+            <a:off x="6495472" y="1431575"/>
+            <a:ext cx="4787189" cy="4913168"/>
+          </a:xfrm>
+          <a:prstGeom prst="rect">
+            <a:avLst/>
+          </a:prstGeom>
+        </p:spPr>
+      </p:pic>
+    </p:spTree>
+    <p:extLst>
+      <p:ext uri="{BB962C8B-B14F-4D97-AF65-F5344CB8AC3E}">
+        <p14:creationId xmlns:p14="http://schemas.microsoft.com/office/powerpoint/2010/main" val="49760073"/>
+      </p:ext>
+    </p:extLst>
+  </p:cSld>
+  <p:clrMapOvr>
+    <a:masterClrMapping/>
+  </p:clrMapOvr>
+</p:sld>
+</file>
+
+<file path=ppt/slides/slide14.xml><?xml version="1.0" encoding="utf-8"?>
+<p:sld xmlns:a="http://schemas.openxmlformats.org/drawingml/2006/main" xmlns:r="http://schemas.openxmlformats.org/officeDocument/2006/relationships" xmlns:p="http://schemas.openxmlformats.org/presentationml/2006/main">
+  <p:cSld>
+    <p:spTree>
+      <p:nvGrpSpPr>
+        <p:cNvPr id="1" name=""/>
+        <p:cNvGrpSpPr/>
+        <p:nvPr/>
+      </p:nvGrpSpPr>
+      <p:grpSpPr>
+        <a:xfrm>
+          <a:off x="0" y="0"/>
+          <a:ext cx="0" cy="0"/>
+          <a:chOff x="0" y="0"/>
+          <a:chExt cx="0" cy="0"/>
+        </a:xfrm>
+      </p:grpSpPr>
+      <p:sp>
+        <p:nvSpPr>
+          <p:cNvPr id="6" name="Title 1">
+            <a:extLst>
+              <a:ext uri="{FF2B5EF4-FFF2-40B4-BE49-F238E27FC236}">
+                <a16:creationId xmlns:a16="http://schemas.microsoft.com/office/drawing/2014/main" id="{CEDA7E1F-EA10-664E-B135-4A53E08CED96}"/>
+              </a:ext>
+            </a:extLst>
+          </p:cNvPr>
+          <p:cNvSpPr>
+            <a:spLocks noGrp="1"/>
+          </p:cNvSpPr>
+          <p:nvPr>
+            <p:ph type="title"/>
+          </p:nvPr>
+        </p:nvSpPr>
+        <p:spPr>
+          <a:xfrm>
+            <a:off x="1141412" y="228903"/>
+            <a:ext cx="9905998" cy="860425"/>
+          </a:xfrm>
+        </p:spPr>
+        <p:txBody>
+          <a:bodyPr>
+            <a:normAutofit/>
+          </a:bodyPr>
+          <a:lstStyle/>
+          <a:p>
+            <a:pPr algn="ctr"/>
+            <a:r>
+              <a:rPr lang="en-US" dirty="0"/>
+              <a:t>Approximation for TSP: Analysis</a:t>
+            </a:r>
+          </a:p>
+        </p:txBody>
+      </p:sp>
+      <p:sp>
+        <p:nvSpPr>
+          <p:cNvPr id="2" name="TextBox 1">
+            <a:extLst>
+              <a:ext uri="{FF2B5EF4-FFF2-40B4-BE49-F238E27FC236}">
+                <a16:creationId xmlns:a16="http://schemas.microsoft.com/office/drawing/2014/main" id="{E5D1DC23-009C-4345-AACE-883EA6E42F99}"/>
+              </a:ext>
+            </a:extLst>
+          </p:cNvPr>
+          <p:cNvSpPr txBox="1"/>
+          <p:nvPr/>
+        </p:nvSpPr>
+        <p:spPr>
+          <a:xfrm>
+            <a:off x="6949930" y="3241964"/>
+            <a:ext cx="3179618" cy="369332"/>
+          </a:xfrm>
+          <a:prstGeom prst="rect">
+            <a:avLst/>
+          </a:prstGeom>
+          <a:noFill/>
+        </p:spPr>
+        <p:txBody>
+          <a:bodyPr wrap="square" rtlCol="0">
+            <a:spAutoFit/>
+          </a:bodyPr>
+          <a:lstStyle/>
+          <a:p>
+            <a:r>
+              <a:rPr lang="en-US" dirty="0"/>
+              <a:t>Runtime is polynomial? YES!!!</a:t>
+            </a:r>
+          </a:p>
+        </p:txBody>
+      </p:sp>
+      <p:pic>
+        <p:nvPicPr>
+          <p:cNvPr id="7" name="Picture 6">
+            <a:extLst>
+              <a:ext uri="{FF2B5EF4-FFF2-40B4-BE49-F238E27FC236}">
+                <a16:creationId xmlns:a16="http://schemas.microsoft.com/office/drawing/2014/main" id="{0C2A4078-E765-BD49-8ED9-15652B067F00}"/>
+              </a:ext>
+            </a:extLst>
+          </p:cNvPr>
+          <p:cNvPicPr>
+            <a:picLocks noChangeAspect="1"/>
+          </p:cNvPicPr>
+          <p:nvPr/>
+        </p:nvPicPr>
+        <p:blipFill>
+          <a:blip r:embed="rId2"/>
+          <a:stretch>
+            <a:fillRect/>
+          </a:stretch>
+        </p:blipFill>
+        <p:spPr>
+          <a:xfrm>
+            <a:off x="544945" y="1999095"/>
+            <a:ext cx="5531356" cy="3549650"/>
+          </a:xfrm>
+          <a:prstGeom prst="rect">
+            <a:avLst/>
+          </a:prstGeom>
+        </p:spPr>
+      </p:pic>
+    </p:spTree>
+    <p:extLst>
+      <p:ext uri="{BB962C8B-B14F-4D97-AF65-F5344CB8AC3E}">
+        <p14:creationId xmlns:p14="http://schemas.microsoft.com/office/powerpoint/2010/main" val="1365046883"/>
+      </p:ext>
+    </p:extLst>
+  </p:cSld>
+  <p:clrMapOvr>
+    <a:masterClrMapping/>
+  </p:clrMapOvr>
+</p:sld>
+</file>
+
+<file path=ppt/slides/slide15.xml><?xml version="1.0" encoding="utf-8"?>
+<p:sld xmlns:a="http://schemas.openxmlformats.org/drawingml/2006/main" xmlns:r="http://schemas.openxmlformats.org/officeDocument/2006/relationships" xmlns:p="http://schemas.openxmlformats.org/presentationml/2006/main">
+  <p:cSld>
+    <p:spTree>
+      <p:nvGrpSpPr>
+        <p:cNvPr id="1" name=""/>
+        <p:cNvGrpSpPr/>
+        <p:nvPr/>
+      </p:nvGrpSpPr>
+      <p:grpSpPr>
+        <a:xfrm>
+          <a:off x="0" y="0"/>
+          <a:ext cx="0" cy="0"/>
+          <a:chOff x="0" y="0"/>
+          <a:chExt cx="0" cy="0"/>
+        </a:xfrm>
+      </p:grpSpPr>
+      <p:sp>
+        <p:nvSpPr>
+          <p:cNvPr id="6" name="Title 1">
+            <a:extLst>
+              <a:ext uri="{FF2B5EF4-FFF2-40B4-BE49-F238E27FC236}">
+                <a16:creationId xmlns:a16="http://schemas.microsoft.com/office/drawing/2014/main" id="{CEDA7E1F-EA10-664E-B135-4A53E08CED96}"/>
+              </a:ext>
+            </a:extLst>
+          </p:cNvPr>
+          <p:cNvSpPr>
+            <a:spLocks noGrp="1"/>
+          </p:cNvSpPr>
+          <p:nvPr>
+            <p:ph type="title"/>
+          </p:nvPr>
+        </p:nvSpPr>
+        <p:spPr>
+          <a:xfrm>
+            <a:off x="1141412" y="228903"/>
+            <a:ext cx="9905998" cy="860425"/>
+          </a:xfrm>
+        </p:spPr>
+        <p:txBody>
+          <a:bodyPr>
+            <a:normAutofit/>
+          </a:bodyPr>
+          <a:lstStyle/>
+          <a:p>
+            <a:pPr algn="ctr"/>
+            <a:r>
+              <a:rPr lang="en-US" dirty="0"/>
+              <a:t>Approximation for TSP: Analysis</a:t>
+            </a:r>
+          </a:p>
+        </p:txBody>
+      </p:sp>
+      <p:sp>
+        <p:nvSpPr>
+          <p:cNvPr id="2" name="TextBox 1">
+            <a:extLst>
+              <a:ext uri="{FF2B5EF4-FFF2-40B4-BE49-F238E27FC236}">
+                <a16:creationId xmlns:a16="http://schemas.microsoft.com/office/drawing/2014/main" id="{E5D1DC23-009C-4345-AACE-883EA6E42F99}"/>
+              </a:ext>
+            </a:extLst>
+          </p:cNvPr>
+          <p:cNvSpPr txBox="1"/>
+          <p:nvPr/>
+        </p:nvSpPr>
+        <p:spPr>
+          <a:xfrm>
+            <a:off x="8913812" y="1496291"/>
+            <a:ext cx="3179618" cy="369332"/>
+          </a:xfrm>
+          <a:prstGeom prst="rect">
+            <a:avLst/>
+          </a:prstGeom>
+          <a:noFill/>
+        </p:spPr>
+        <p:txBody>
+          <a:bodyPr wrap="square" rtlCol="0">
+            <a:spAutoFit/>
+          </a:bodyPr>
+          <a:lstStyle/>
+          <a:p>
+            <a:r>
+              <a:rPr lang="en-US" dirty="0" err="1"/>
+              <a:t>Approx</a:t>
+            </a:r>
+            <a:r>
+              <a:rPr lang="en-US" dirty="0"/>
+              <a:t> ratio??</a:t>
+            </a:r>
+          </a:p>
+        </p:txBody>
+      </p:sp>
+      <p:pic>
+        <p:nvPicPr>
+          <p:cNvPr id="4" name="Picture 3">
+            <a:extLst>
+              <a:ext uri="{FF2B5EF4-FFF2-40B4-BE49-F238E27FC236}">
+                <a16:creationId xmlns:a16="http://schemas.microsoft.com/office/drawing/2014/main" id="{B3C6D5E8-56FE-F247-8A31-457D7A6FA50C}"/>
+              </a:ext>
+            </a:extLst>
+          </p:cNvPr>
+          <p:cNvPicPr>
+            <a:picLocks noChangeAspect="1"/>
+          </p:cNvPicPr>
+          <p:nvPr/>
+        </p:nvPicPr>
+        <p:blipFill>
+          <a:blip r:embed="rId2"/>
+          <a:stretch>
+            <a:fillRect/>
+          </a:stretch>
+        </p:blipFill>
+        <p:spPr>
+          <a:xfrm>
+            <a:off x="867063" y="1670566"/>
+            <a:ext cx="4858327" cy="4781818"/>
+          </a:xfrm>
+          <a:prstGeom prst="rect">
+            <a:avLst/>
+          </a:prstGeom>
+        </p:spPr>
+      </p:pic>
+      <p:pic>
+        <p:nvPicPr>
+          <p:cNvPr id="8" name="Picture 7">
+            <a:extLst>
+              <a:ext uri="{FF2B5EF4-FFF2-40B4-BE49-F238E27FC236}">
+                <a16:creationId xmlns:a16="http://schemas.microsoft.com/office/drawing/2014/main" id="{F03B3E44-2F54-844D-AD7A-28F511597F19}"/>
+              </a:ext>
+            </a:extLst>
+          </p:cNvPr>
+          <p:cNvPicPr>
+            <a:picLocks noChangeAspect="1"/>
+          </p:cNvPicPr>
+          <p:nvPr/>
+        </p:nvPicPr>
+        <p:blipFill>
+          <a:blip r:embed="rId3"/>
+          <a:stretch>
+            <a:fillRect/>
+          </a:stretch>
+        </p:blipFill>
+        <p:spPr>
+          <a:xfrm>
+            <a:off x="6202219" y="2037194"/>
+            <a:ext cx="4629692" cy="4415189"/>
+          </a:xfrm>
+          <a:prstGeom prst="rect">
+            <a:avLst/>
+          </a:prstGeom>
+        </p:spPr>
+      </p:pic>
+    </p:spTree>
+    <p:extLst>
+      <p:ext uri="{BB962C8B-B14F-4D97-AF65-F5344CB8AC3E}">
+        <p14:creationId xmlns:p14="http://schemas.microsoft.com/office/powerpoint/2010/main" val="4278794053"/>
+      </p:ext>
+    </p:extLst>
+  </p:cSld>
+  <p:clrMapOvr>
+    <a:masterClrMapping/>
+  </p:clrMapOvr>
+</p:sld>
+</file>
+
+<file path=ppt/slides/slide16.xml><?xml version="1.0" encoding="utf-8"?>
+<p:sld xmlns:a="http://schemas.openxmlformats.org/drawingml/2006/main" xmlns:r="http://schemas.openxmlformats.org/officeDocument/2006/relationships" xmlns:p="http://schemas.openxmlformats.org/presentationml/2006/main">
+  <p:cSld>
+    <p:spTree>
+      <p:nvGrpSpPr>
+        <p:cNvPr id="1" name=""/>
+        <p:cNvGrpSpPr/>
+        <p:nvPr/>
+      </p:nvGrpSpPr>
+      <p:grpSpPr>
+        <a:xfrm>
+          <a:off x="0" y="0"/>
+          <a:ext cx="0" cy="0"/>
+          <a:chOff x="0" y="0"/>
+          <a:chExt cx="0" cy="0"/>
+        </a:xfrm>
+      </p:grpSpPr>
+      <p:sp>
+        <p:nvSpPr>
+          <p:cNvPr id="6" name="Title 1">
+            <a:extLst>
+              <a:ext uri="{FF2B5EF4-FFF2-40B4-BE49-F238E27FC236}">
+                <a16:creationId xmlns:a16="http://schemas.microsoft.com/office/drawing/2014/main" id="{CEDA7E1F-EA10-664E-B135-4A53E08CED96}"/>
+              </a:ext>
+            </a:extLst>
+          </p:cNvPr>
+          <p:cNvSpPr>
+            <a:spLocks noGrp="1"/>
+          </p:cNvSpPr>
+          <p:nvPr>
+            <p:ph type="title"/>
+          </p:nvPr>
+        </p:nvSpPr>
+        <p:spPr>
+          <a:xfrm>
+            <a:off x="1141412" y="228903"/>
+            <a:ext cx="9905998" cy="860425"/>
+          </a:xfrm>
+        </p:spPr>
+        <p:txBody>
+          <a:bodyPr>
+            <a:normAutofit/>
+          </a:bodyPr>
+          <a:lstStyle/>
+          <a:p>
+            <a:pPr algn="ctr"/>
+            <a:r>
+              <a:rPr lang="en-US" dirty="0"/>
+              <a:t>An Interesting Fact About This</a:t>
+            </a:r>
+          </a:p>
+        </p:txBody>
+      </p:sp>
+      <p:sp>
+        <p:nvSpPr>
+          <p:cNvPr id="2" name="TextBox 1">
+            <a:extLst>
+              <a:ext uri="{FF2B5EF4-FFF2-40B4-BE49-F238E27FC236}">
+                <a16:creationId xmlns:a16="http://schemas.microsoft.com/office/drawing/2014/main" id="{E5D1DC23-009C-4345-AACE-883EA6E42F99}"/>
+              </a:ext>
+            </a:extLst>
+          </p:cNvPr>
+          <p:cNvSpPr txBox="1"/>
+          <p:nvPr/>
+        </p:nvSpPr>
+        <p:spPr>
+          <a:xfrm>
+            <a:off x="8913812" y="1496291"/>
+            <a:ext cx="3179618" cy="369332"/>
+          </a:xfrm>
+          <a:prstGeom prst="rect">
+            <a:avLst/>
+          </a:prstGeom>
+          <a:noFill/>
+        </p:spPr>
+        <p:txBody>
+          <a:bodyPr wrap="square" rtlCol="0">
+            <a:spAutoFit/>
+          </a:bodyPr>
+          <a:lstStyle/>
+          <a:p>
+            <a:r>
+              <a:rPr lang="en-US" dirty="0" err="1"/>
+              <a:t>Approx</a:t>
+            </a:r>
+            <a:r>
+              <a:rPr lang="en-US" dirty="0"/>
+              <a:t> ratio??</a:t>
+            </a:r>
+          </a:p>
+        </p:txBody>
+      </p:sp>
+      <p:pic>
+        <p:nvPicPr>
+          <p:cNvPr id="5" name="Picture 4">
+            <a:extLst>
+              <a:ext uri="{FF2B5EF4-FFF2-40B4-BE49-F238E27FC236}">
+                <a16:creationId xmlns:a16="http://schemas.microsoft.com/office/drawing/2014/main" id="{69346FB9-1C46-464A-AAF1-5BF2B8E0A314}"/>
+              </a:ext>
+            </a:extLst>
+          </p:cNvPr>
+          <p:cNvPicPr>
+            <a:picLocks noChangeAspect="1"/>
+          </p:cNvPicPr>
+          <p:nvPr/>
+        </p:nvPicPr>
+        <p:blipFill>
+          <a:blip r:embed="rId2"/>
+          <a:stretch>
+            <a:fillRect/>
+          </a:stretch>
+        </p:blipFill>
+        <p:spPr>
+          <a:xfrm>
+            <a:off x="6585311" y="2113971"/>
+            <a:ext cx="4657001" cy="4476497"/>
+          </a:xfrm>
+          <a:prstGeom prst="rect">
+            <a:avLst/>
+          </a:prstGeom>
+        </p:spPr>
+      </p:pic>
+      <p:pic>
+        <p:nvPicPr>
+          <p:cNvPr id="9" name="Picture 8">
+            <a:extLst>
+              <a:ext uri="{FF2B5EF4-FFF2-40B4-BE49-F238E27FC236}">
+                <a16:creationId xmlns:a16="http://schemas.microsoft.com/office/drawing/2014/main" id="{0B3D4F44-A8CF-8347-A977-DA795F2FBFED}"/>
+              </a:ext>
+            </a:extLst>
+          </p:cNvPr>
+          <p:cNvPicPr>
+            <a:picLocks noChangeAspect="1"/>
+          </p:cNvPicPr>
+          <p:nvPr/>
+        </p:nvPicPr>
+        <p:blipFill>
+          <a:blip r:embed="rId3"/>
+          <a:stretch>
+            <a:fillRect/>
+          </a:stretch>
+        </p:blipFill>
+        <p:spPr>
+          <a:xfrm>
+            <a:off x="1141412" y="1691410"/>
+            <a:ext cx="4665519" cy="4701686"/>
+          </a:xfrm>
+          <a:prstGeom prst="rect">
+            <a:avLst/>
+          </a:prstGeom>
+        </p:spPr>
+      </p:pic>
+    </p:spTree>
+    <p:extLst>
+      <p:ext uri="{BB962C8B-B14F-4D97-AF65-F5344CB8AC3E}">
+        <p14:creationId xmlns:p14="http://schemas.microsoft.com/office/powerpoint/2010/main" val="768529979"/>
+      </p:ext>
+    </p:extLst>
+  </p:cSld>
+  <p:clrMapOvr>
+    <a:masterClrMapping/>
+  </p:clrMapOvr>
+</p:sld>
+</file>
+
+<file path=ppt/slides/slide17.xml><?xml version="1.0" encoding="utf-8"?>
+<p:sld xmlns:a="http://schemas.openxmlformats.org/drawingml/2006/main" xmlns:r="http://schemas.openxmlformats.org/officeDocument/2006/relationships" xmlns:p="http://schemas.openxmlformats.org/presentationml/2006/main">
+  <p:cSld>
+    <p:spTree>
+      <p:nvGrpSpPr>
+        <p:cNvPr id="1" name=""/>
+        <p:cNvGrpSpPr/>
+        <p:nvPr/>
+      </p:nvGrpSpPr>
+      <p:grpSpPr>
+        <a:xfrm>
+          <a:off x="0" y="0"/>
+          <a:ext cx="0" cy="0"/>
+          <a:chOff x="0" y="0"/>
+          <a:chExt cx="0" cy="0"/>
+        </a:xfrm>
+      </p:grpSpPr>
+      <p:sp>
+        <p:nvSpPr>
+          <p:cNvPr id="2" name="Title 1">
+            <a:extLst>
+              <a:ext uri="{FF2B5EF4-FFF2-40B4-BE49-F238E27FC236}">
+                <a16:creationId xmlns:a16="http://schemas.microsoft.com/office/drawing/2014/main" id="{87719C56-21DC-0A40-AA49-9AF4AF4C92DA}"/>
+              </a:ext>
+            </a:extLst>
+          </p:cNvPr>
+          <p:cNvSpPr>
+            <a:spLocks noGrp="1"/>
+          </p:cNvSpPr>
+          <p:nvPr>
+            <p:ph type="title"/>
+          </p:nvPr>
+        </p:nvSpPr>
+        <p:spPr>
+          <a:xfrm>
+            <a:off x="1141411" y="1860330"/>
+            <a:ext cx="9906000" cy="2175149"/>
+          </a:xfrm>
+        </p:spPr>
+        <p:txBody>
+          <a:bodyPr/>
+          <a:lstStyle/>
+          <a:p>
+            <a:pPr algn="ctr"/>
+            <a:r>
+              <a:rPr lang="en-US" dirty="0"/>
+              <a:t>Set Cover</a:t>
+            </a:r>
+          </a:p>
+        </p:txBody>
+      </p:sp>
+    </p:spTree>
+    <p:extLst>
+      <p:ext uri="{BB962C8B-B14F-4D97-AF65-F5344CB8AC3E}">
+        <p14:creationId xmlns:p14="http://schemas.microsoft.com/office/powerpoint/2010/main" val="837661682"/>
+      </p:ext>
+    </p:extLst>
+  </p:cSld>
+  <p:clrMapOvr>
+    <a:masterClrMapping/>
+  </p:clrMapOvr>
+</p:sld>
+</file>
+
+<file path=ppt/slides/slide18.xml><?xml version="1.0" encoding="utf-8"?>
+<p:sld xmlns:a="http://schemas.openxmlformats.org/drawingml/2006/main" xmlns:r="http://schemas.openxmlformats.org/officeDocument/2006/relationships" xmlns:p="http://schemas.openxmlformats.org/presentationml/2006/main">
+  <p:cSld>
+    <p:spTree>
+      <p:nvGrpSpPr>
+        <p:cNvPr id="1" name=""/>
+        <p:cNvGrpSpPr/>
+        <p:nvPr/>
+      </p:nvGrpSpPr>
+      <p:grpSpPr>
+        <a:xfrm>
+          <a:off x="0" y="0"/>
+          <a:ext cx="0" cy="0"/>
+          <a:chOff x="0" y="0"/>
+          <a:chExt cx="0" cy="0"/>
+        </a:xfrm>
+      </p:grpSpPr>
+      <p:sp>
+        <p:nvSpPr>
+          <p:cNvPr id="6" name="Title 1">
+            <a:extLst>
+              <a:ext uri="{FF2B5EF4-FFF2-40B4-BE49-F238E27FC236}">
+                <a16:creationId xmlns:a16="http://schemas.microsoft.com/office/drawing/2014/main" id="{CEDA7E1F-EA10-664E-B135-4A53E08CED96}"/>
+              </a:ext>
+            </a:extLst>
+          </p:cNvPr>
+          <p:cNvSpPr>
+            <a:spLocks noGrp="1"/>
+          </p:cNvSpPr>
+          <p:nvPr>
+            <p:ph type="title"/>
+          </p:nvPr>
+        </p:nvSpPr>
+        <p:spPr>
+          <a:xfrm>
+            <a:off x="1141412" y="228903"/>
+            <a:ext cx="9905998" cy="860425"/>
+          </a:xfrm>
+        </p:spPr>
+        <p:txBody>
+          <a:bodyPr/>
+          <a:lstStyle/>
+          <a:p>
+            <a:pPr algn="ctr"/>
+            <a:r>
+              <a:rPr lang="en-US" dirty="0"/>
+              <a:t>Set Cover Problem</a:t>
+            </a:r>
+          </a:p>
+        </p:txBody>
+      </p:sp>
+      <p:sp>
+        <p:nvSpPr>
+          <p:cNvPr id="2" name="TextBox 1">
+            <a:extLst>
+              <a:ext uri="{FF2B5EF4-FFF2-40B4-BE49-F238E27FC236}">
+                <a16:creationId xmlns:a16="http://schemas.microsoft.com/office/drawing/2014/main" id="{E5D1DC23-009C-4345-AACE-883EA6E42F99}"/>
+              </a:ext>
+            </a:extLst>
+          </p:cNvPr>
+          <p:cNvSpPr txBox="1"/>
+          <p:nvPr/>
+        </p:nvSpPr>
+        <p:spPr>
+          <a:xfrm>
+            <a:off x="1444336" y="1315673"/>
+            <a:ext cx="3179618" cy="369332"/>
+          </a:xfrm>
+          <a:prstGeom prst="rect">
+            <a:avLst/>
+          </a:prstGeom>
+          <a:noFill/>
+        </p:spPr>
+        <p:txBody>
+          <a:bodyPr wrap="square" rtlCol="0">
+            <a:spAutoFit/>
+          </a:bodyPr>
+          <a:lstStyle/>
+          <a:p>
+            <a:r>
+              <a:rPr lang="en-US" dirty="0"/>
+              <a:t>Text Box</a:t>
+            </a:r>
+          </a:p>
+        </p:txBody>
+      </p:sp>
+      <p:pic>
+        <p:nvPicPr>
+          <p:cNvPr id="7" name="Picture 6">
+            <a:extLst>
+              <a:ext uri="{FF2B5EF4-FFF2-40B4-BE49-F238E27FC236}">
+                <a16:creationId xmlns:a16="http://schemas.microsoft.com/office/drawing/2014/main" id="{D8BE3E2F-F57B-184F-8359-136A6B2B5569}"/>
+              </a:ext>
+            </a:extLst>
+          </p:cNvPr>
+          <p:cNvPicPr>
+            <a:picLocks noChangeAspect="1"/>
+          </p:cNvPicPr>
+          <p:nvPr/>
+        </p:nvPicPr>
+        <p:blipFill>
+          <a:blip r:embed="rId2"/>
+          <a:stretch>
+            <a:fillRect/>
+          </a:stretch>
+        </p:blipFill>
+        <p:spPr>
+          <a:xfrm>
+            <a:off x="2047586" y="2139950"/>
+            <a:ext cx="4509077" cy="4259563"/>
+          </a:xfrm>
+          <a:prstGeom prst="rect">
+            <a:avLst/>
+          </a:prstGeom>
+        </p:spPr>
+      </p:pic>
+    </p:spTree>
+    <p:extLst>
+      <p:ext uri="{BB962C8B-B14F-4D97-AF65-F5344CB8AC3E}">
+        <p14:creationId xmlns:p14="http://schemas.microsoft.com/office/powerpoint/2010/main" val="3018216559"/>
+      </p:ext>
+    </p:extLst>
+  </p:cSld>
+  <p:clrMapOvr>
+    <a:masterClrMapping/>
+  </p:clrMapOvr>
+</p:sld>
+</file>
+
+<file path=ppt/slides/slide19.xml><?xml version="1.0" encoding="utf-8"?>
+<p:sld xmlns:a="http://schemas.openxmlformats.org/drawingml/2006/main" xmlns:r="http://schemas.openxmlformats.org/officeDocument/2006/relationships" xmlns:p="http://schemas.openxmlformats.org/presentationml/2006/main">
+  <p:cSld>
+    <p:spTree>
+      <p:nvGrpSpPr>
+        <p:cNvPr id="1" name=""/>
+        <p:cNvGrpSpPr/>
+        <p:nvPr/>
+      </p:nvGrpSpPr>
+      <p:grpSpPr>
+        <a:xfrm>
+          <a:off x="0" y="0"/>
+          <a:ext cx="0" cy="0"/>
+          <a:chOff x="0" y="0"/>
+          <a:chExt cx="0" cy="0"/>
+        </a:xfrm>
+      </p:grpSpPr>
+      <p:sp>
+        <p:nvSpPr>
+          <p:cNvPr id="6" name="Title 1">
+            <a:extLst>
+              <a:ext uri="{FF2B5EF4-FFF2-40B4-BE49-F238E27FC236}">
+                <a16:creationId xmlns:a16="http://schemas.microsoft.com/office/drawing/2014/main" id="{CEDA7E1F-EA10-664E-B135-4A53E08CED96}"/>
+              </a:ext>
+            </a:extLst>
+          </p:cNvPr>
+          <p:cNvSpPr>
+            <a:spLocks noGrp="1"/>
+          </p:cNvSpPr>
+          <p:nvPr>
+            <p:ph type="title"/>
+          </p:nvPr>
+        </p:nvSpPr>
+        <p:spPr>
+          <a:xfrm>
+            <a:off x="1141412" y="228903"/>
+            <a:ext cx="9905998" cy="860425"/>
+          </a:xfrm>
+        </p:spPr>
+        <p:txBody>
+          <a:bodyPr/>
+          <a:lstStyle/>
+          <a:p>
+            <a:pPr algn="ctr"/>
+            <a:r>
+              <a:rPr lang="en-US" dirty="0"/>
+              <a:t>Approximating Set Cover</a:t>
+            </a:r>
+          </a:p>
+        </p:txBody>
+      </p:sp>
+      <p:sp>
+        <p:nvSpPr>
+          <p:cNvPr id="2" name="TextBox 1">
+            <a:extLst>
+              <a:ext uri="{FF2B5EF4-FFF2-40B4-BE49-F238E27FC236}">
+                <a16:creationId xmlns:a16="http://schemas.microsoft.com/office/drawing/2014/main" id="{E5D1DC23-009C-4345-AACE-883EA6E42F99}"/>
+              </a:ext>
+            </a:extLst>
+          </p:cNvPr>
+          <p:cNvSpPr txBox="1"/>
+          <p:nvPr/>
+        </p:nvSpPr>
+        <p:spPr>
+          <a:xfrm>
+            <a:off x="1392382" y="1361209"/>
+            <a:ext cx="3179618" cy="369332"/>
+          </a:xfrm>
+          <a:prstGeom prst="rect">
+            <a:avLst/>
+          </a:prstGeom>
+          <a:noFill/>
+        </p:spPr>
+        <p:txBody>
+          <a:bodyPr wrap="square" rtlCol="0">
+            <a:spAutoFit/>
+          </a:bodyPr>
+          <a:lstStyle/>
+          <a:p>
+            <a:r>
+              <a:rPr lang="en-US" dirty="0"/>
+              <a:t>Text Box</a:t>
+            </a:r>
+          </a:p>
+        </p:txBody>
+      </p:sp>
+      <p:pic>
+        <p:nvPicPr>
+          <p:cNvPr id="7" name="Picture 6">
+            <a:extLst>
+              <a:ext uri="{FF2B5EF4-FFF2-40B4-BE49-F238E27FC236}">
+                <a16:creationId xmlns:a16="http://schemas.microsoft.com/office/drawing/2014/main" id="{C4E2A7C5-9FFE-064E-947E-6A59D3348A42}"/>
+              </a:ext>
+            </a:extLst>
+          </p:cNvPr>
+          <p:cNvPicPr>
+            <a:picLocks noChangeAspect="1"/>
+          </p:cNvPicPr>
+          <p:nvPr/>
+        </p:nvPicPr>
+        <p:blipFill>
+          <a:blip r:embed="rId2"/>
+          <a:stretch>
+            <a:fillRect/>
+          </a:stretch>
+        </p:blipFill>
+        <p:spPr>
+          <a:xfrm>
+            <a:off x="4717471" y="1629064"/>
+            <a:ext cx="4762177" cy="4356100"/>
+          </a:xfrm>
+          <a:prstGeom prst="rect">
+            <a:avLst/>
+          </a:prstGeom>
+        </p:spPr>
+      </p:pic>
+    </p:spTree>
+    <p:extLst>
+      <p:ext uri="{BB962C8B-B14F-4D97-AF65-F5344CB8AC3E}">
+        <p14:creationId xmlns:p14="http://schemas.microsoft.com/office/powerpoint/2010/main" val="1977289856"/>
+      </p:ext>
+    </p:extLst>
+  </p:cSld>
+  <p:clrMapOvr>
+    <a:masterClrMapping/>
+  </p:clrMapOvr>
+</p:sld>
+</file>
+
 <file path=ppt/slides/slide2.xml><?xml version="1.0" encoding="utf-8"?>
 <p:sld xmlns:a="http://schemas.openxmlformats.org/drawingml/2006/main" xmlns:r="http://schemas.openxmlformats.org/officeDocument/2006/relationships" xmlns:p="http://schemas.openxmlformats.org/presentationml/2006/main">
   <p:cSld>
@@ -13052,8 +14378,8 @@
         </p:nvSpPr>
         <p:spPr>
           <a:xfrm>
-            <a:off x="4130566" y="1844566"/>
-            <a:ext cx="5264287" cy="4230231"/>
+            <a:off x="3140886" y="1813393"/>
+            <a:ext cx="6156434" cy="4230231"/>
           </a:xfrm>
           <a:prstGeom prst="rect">
             <a:avLst/>
@@ -13291,6 +14617,13 @@
               <a:rPr lang="en-US" sz="2000" b="1" i="1" dirty="0"/>
               <a:t>	- Set-Covering Approximation</a:t>
             </a:r>
+            <a:br>
+              <a:rPr lang="en-US" sz="2000" b="1" i="1" dirty="0"/>
+            </a:br>
+            <a:r>
+              <a:rPr lang="en-US" sz="2000" b="1" i="1" dirty="0"/>
+              <a:t>	- Randomization and Linear Programming (maybe)</a:t>
+            </a:r>
           </a:p>
         </p:txBody>
       </p:sp>
@@ -13307,7 +14640,196 @@
 </p:sld>
 </file>
 
-<file path=ppt/slides/slide3.xml><?xml version="1.0" encoding="utf-8"?>
+<file path=ppt/slides/slide20.xml><?xml version="1.0" encoding="utf-8"?>
+<p:sld xmlns:a="http://schemas.openxmlformats.org/drawingml/2006/main" xmlns:r="http://schemas.openxmlformats.org/officeDocument/2006/relationships" xmlns:p="http://schemas.openxmlformats.org/presentationml/2006/main">
+  <p:cSld>
+    <p:spTree>
+      <p:nvGrpSpPr>
+        <p:cNvPr id="1" name=""/>
+        <p:cNvGrpSpPr/>
+        <p:nvPr/>
+      </p:nvGrpSpPr>
+      <p:grpSpPr>
+        <a:xfrm>
+          <a:off x="0" y="0"/>
+          <a:ext cx="0" cy="0"/>
+          <a:chOff x="0" y="0"/>
+          <a:chExt cx="0" cy="0"/>
+        </a:xfrm>
+      </p:grpSpPr>
+      <p:sp>
+        <p:nvSpPr>
+          <p:cNvPr id="6" name="Title 1">
+            <a:extLst>
+              <a:ext uri="{FF2B5EF4-FFF2-40B4-BE49-F238E27FC236}">
+                <a16:creationId xmlns:a16="http://schemas.microsoft.com/office/drawing/2014/main" id="{CEDA7E1F-EA10-664E-B135-4A53E08CED96}"/>
+              </a:ext>
+            </a:extLst>
+          </p:cNvPr>
+          <p:cNvSpPr>
+            <a:spLocks noGrp="1"/>
+          </p:cNvSpPr>
+          <p:nvPr>
+            <p:ph type="title"/>
+          </p:nvPr>
+        </p:nvSpPr>
+        <p:spPr>
+          <a:xfrm>
+            <a:off x="1141412" y="228903"/>
+            <a:ext cx="9905998" cy="860425"/>
+          </a:xfrm>
+        </p:spPr>
+        <p:txBody>
+          <a:bodyPr/>
+          <a:lstStyle/>
+          <a:p>
+            <a:pPr algn="ctr"/>
+            <a:r>
+              <a:rPr lang="en-US" dirty="0"/>
+              <a:t>Analysis</a:t>
+            </a:r>
+          </a:p>
+        </p:txBody>
+      </p:sp>
+      <p:sp>
+        <p:nvSpPr>
+          <p:cNvPr id="2" name="TextBox 1">
+            <a:extLst>
+              <a:ext uri="{FF2B5EF4-FFF2-40B4-BE49-F238E27FC236}">
+                <a16:creationId xmlns:a16="http://schemas.microsoft.com/office/drawing/2014/main" id="{E5D1DC23-009C-4345-AACE-883EA6E42F99}"/>
+              </a:ext>
+            </a:extLst>
+          </p:cNvPr>
+          <p:cNvSpPr txBox="1"/>
+          <p:nvPr/>
+        </p:nvSpPr>
+        <p:spPr>
+          <a:xfrm>
+            <a:off x="1392382" y="1361209"/>
+            <a:ext cx="3179618" cy="369332"/>
+          </a:xfrm>
+          <a:prstGeom prst="rect">
+            <a:avLst/>
+          </a:prstGeom>
+          <a:noFill/>
+        </p:spPr>
+        <p:txBody>
+          <a:bodyPr wrap="square" rtlCol="0">
+            <a:spAutoFit/>
+          </a:bodyPr>
+          <a:lstStyle/>
+          <a:p>
+            <a:r>
+              <a:rPr lang="en-US" dirty="0"/>
+              <a:t>Text Box</a:t>
+            </a:r>
+          </a:p>
+        </p:txBody>
+      </p:sp>
+      <p:pic>
+        <p:nvPicPr>
+          <p:cNvPr id="4" name="Picture 3">
+            <a:extLst>
+              <a:ext uri="{FF2B5EF4-FFF2-40B4-BE49-F238E27FC236}">
+                <a16:creationId xmlns:a16="http://schemas.microsoft.com/office/drawing/2014/main" id="{B299879E-300E-FB48-B3DE-604ABD919A4C}"/>
+              </a:ext>
+            </a:extLst>
+          </p:cNvPr>
+          <p:cNvPicPr>
+            <a:picLocks noChangeAspect="1"/>
+          </p:cNvPicPr>
+          <p:nvPr/>
+        </p:nvPicPr>
+        <p:blipFill>
+          <a:blip r:embed="rId2"/>
+          <a:stretch>
+            <a:fillRect/>
+          </a:stretch>
+        </p:blipFill>
+        <p:spPr>
+          <a:xfrm>
+            <a:off x="226869" y="1545875"/>
+            <a:ext cx="4345131" cy="5009680"/>
+          </a:xfrm>
+          <a:prstGeom prst="rect">
+            <a:avLst/>
+          </a:prstGeom>
+        </p:spPr>
+      </p:pic>
+      <p:pic>
+        <p:nvPicPr>
+          <p:cNvPr id="8" name="Picture 7">
+            <a:extLst>
+              <a:ext uri="{FF2B5EF4-FFF2-40B4-BE49-F238E27FC236}">
+                <a16:creationId xmlns:a16="http://schemas.microsoft.com/office/drawing/2014/main" id="{282F64F1-A6DC-DE49-BFA3-7FADE522CC56}"/>
+              </a:ext>
+            </a:extLst>
+          </p:cNvPr>
+          <p:cNvPicPr>
+            <a:picLocks noChangeAspect="1"/>
+          </p:cNvPicPr>
+          <p:nvPr/>
+        </p:nvPicPr>
+        <p:blipFill>
+          <a:blip r:embed="rId3"/>
+          <a:stretch>
+            <a:fillRect/>
+          </a:stretch>
+        </p:blipFill>
+        <p:spPr>
+          <a:xfrm>
+            <a:off x="8459078" y="1361209"/>
+            <a:ext cx="3732922" cy="5162256"/>
+          </a:xfrm>
+          <a:prstGeom prst="rect">
+            <a:avLst/>
+          </a:prstGeom>
+        </p:spPr>
+      </p:pic>
+      <p:pic>
+        <p:nvPicPr>
+          <p:cNvPr id="10" name="Picture 9">
+            <a:extLst>
+              <a:ext uri="{FF2B5EF4-FFF2-40B4-BE49-F238E27FC236}">
+                <a16:creationId xmlns:a16="http://schemas.microsoft.com/office/drawing/2014/main" id="{2D916F7E-B259-B84B-AC33-A29CACEFBDD1}"/>
+              </a:ext>
+            </a:extLst>
+          </p:cNvPr>
+          <p:cNvPicPr>
+            <a:picLocks noChangeAspect="1"/>
+          </p:cNvPicPr>
+          <p:nvPr/>
+        </p:nvPicPr>
+        <p:blipFill>
+          <a:blip r:embed="rId4"/>
+          <a:stretch>
+            <a:fillRect/>
+          </a:stretch>
+        </p:blipFill>
+        <p:spPr>
+          <a:xfrm>
+            <a:off x="4451349" y="1742755"/>
+            <a:ext cx="4007729" cy="3961307"/>
+          </a:xfrm>
+          <a:prstGeom prst="rect">
+            <a:avLst/>
+          </a:prstGeom>
+        </p:spPr>
+      </p:pic>
+    </p:spTree>
+    <p:extLst>
+      <p:ext uri="{BB962C8B-B14F-4D97-AF65-F5344CB8AC3E}">
+        <p14:creationId xmlns:p14="http://schemas.microsoft.com/office/powerpoint/2010/main" val="1677596511"/>
+      </p:ext>
+    </p:extLst>
+  </p:cSld>
+  <p:clrMapOvr>
+    <a:masterClrMapping/>
+  </p:clrMapOvr>
+</p:sld>
+</file>
+
+<file path=ppt/slides/slide21.xml><?xml version="1.0" encoding="utf-8"?>
 <p:sld xmlns:a="http://schemas.openxmlformats.org/drawingml/2006/main" xmlns:r="http://schemas.openxmlformats.org/officeDocument/2006/relationships" xmlns:p="http://schemas.openxmlformats.org/presentationml/2006/main">
   <p:cSld>
     <p:spTree>
@@ -13353,7 +14875,7 @@
             <a:pPr algn="ctr"/>
             <a:r>
               <a:rPr lang="en-US" dirty="0"/>
-              <a:t>Introduction: Approximation</a:t>
+              <a:t>Randomization And Linear Programming</a:t>
             </a:r>
           </a:p>
         </p:txBody>
@@ -13361,7 +14883,7 @@
     </p:spTree>
     <p:extLst>
       <p:ext uri="{BB962C8B-B14F-4D97-AF65-F5344CB8AC3E}">
-        <p14:creationId xmlns:p14="http://schemas.microsoft.com/office/powerpoint/2010/main" val="3558387040"/>
+        <p14:creationId xmlns:p14="http://schemas.microsoft.com/office/powerpoint/2010/main" val="1185670929"/>
       </p:ext>
     </p:extLst>
   </p:cSld>
@@ -13371,199 +14893,7 @@
 </p:sld>
 </file>
 
-<file path=ppt/slides/slide4.xml><?xml version="1.0" encoding="utf-8"?>
-<p:sld xmlns:a="http://schemas.openxmlformats.org/drawingml/2006/main" xmlns:r="http://schemas.openxmlformats.org/officeDocument/2006/relationships" xmlns:p="http://schemas.openxmlformats.org/presentationml/2006/main">
-  <p:cSld>
-    <p:spTree>
-      <p:nvGrpSpPr>
-        <p:cNvPr id="1" name=""/>
-        <p:cNvGrpSpPr/>
-        <p:nvPr/>
-      </p:nvGrpSpPr>
-      <p:grpSpPr>
-        <a:xfrm>
-          <a:off x="0" y="0"/>
-          <a:ext cx="0" cy="0"/>
-          <a:chOff x="0" y="0"/>
-          <a:chExt cx="0" cy="0"/>
-        </a:xfrm>
-      </p:grpSpPr>
-      <p:sp>
-        <p:nvSpPr>
-          <p:cNvPr id="2" name="Title 1">
-            <a:extLst>
-              <a:ext uri="{FF2B5EF4-FFF2-40B4-BE49-F238E27FC236}">
-                <a16:creationId xmlns:a16="http://schemas.microsoft.com/office/drawing/2014/main" id="{87719C56-21DC-0A40-AA49-9AF4AF4C92DA}"/>
-              </a:ext>
-            </a:extLst>
-          </p:cNvPr>
-          <p:cNvSpPr>
-            <a:spLocks noGrp="1"/>
-          </p:cNvSpPr>
-          <p:nvPr>
-            <p:ph type="title"/>
-          </p:nvPr>
-        </p:nvSpPr>
-        <p:spPr>
-          <a:xfrm>
-            <a:off x="1141411" y="1860330"/>
-            <a:ext cx="9906000" cy="2175149"/>
-          </a:xfrm>
-        </p:spPr>
-        <p:txBody>
-          <a:bodyPr/>
-          <a:lstStyle/>
-          <a:p>
-            <a:pPr algn="ctr"/>
-            <a:r>
-              <a:rPr lang="en-US" dirty="0"/>
-              <a:t>Vertex-Cover</a:t>
-            </a:r>
-          </a:p>
-        </p:txBody>
-      </p:sp>
-    </p:spTree>
-    <p:extLst>
-      <p:ext uri="{BB962C8B-B14F-4D97-AF65-F5344CB8AC3E}">
-        <p14:creationId xmlns:p14="http://schemas.microsoft.com/office/powerpoint/2010/main" val="1586894801"/>
-      </p:ext>
-    </p:extLst>
-  </p:cSld>
-  <p:clrMapOvr>
-    <a:masterClrMapping/>
-  </p:clrMapOvr>
-</p:sld>
-</file>
-
-<file path=ppt/slides/slide5.xml><?xml version="1.0" encoding="utf-8"?>
-<p:sld xmlns:a="http://schemas.openxmlformats.org/drawingml/2006/main" xmlns:r="http://schemas.openxmlformats.org/officeDocument/2006/relationships" xmlns:p="http://schemas.openxmlformats.org/presentationml/2006/main">
-  <p:cSld>
-    <p:spTree>
-      <p:nvGrpSpPr>
-        <p:cNvPr id="1" name=""/>
-        <p:cNvGrpSpPr/>
-        <p:nvPr/>
-      </p:nvGrpSpPr>
-      <p:grpSpPr>
-        <a:xfrm>
-          <a:off x="0" y="0"/>
-          <a:ext cx="0" cy="0"/>
-          <a:chOff x="0" y="0"/>
-          <a:chExt cx="0" cy="0"/>
-        </a:xfrm>
-      </p:grpSpPr>
-      <p:sp>
-        <p:nvSpPr>
-          <p:cNvPr id="2" name="Title 1">
-            <a:extLst>
-              <a:ext uri="{FF2B5EF4-FFF2-40B4-BE49-F238E27FC236}">
-                <a16:creationId xmlns:a16="http://schemas.microsoft.com/office/drawing/2014/main" id="{87719C56-21DC-0A40-AA49-9AF4AF4C92DA}"/>
-              </a:ext>
-            </a:extLst>
-          </p:cNvPr>
-          <p:cNvSpPr>
-            <a:spLocks noGrp="1"/>
-          </p:cNvSpPr>
-          <p:nvPr>
-            <p:ph type="title"/>
-          </p:nvPr>
-        </p:nvSpPr>
-        <p:spPr>
-          <a:xfrm>
-            <a:off x="1141411" y="1860330"/>
-            <a:ext cx="9906000" cy="2175149"/>
-          </a:xfrm>
-        </p:spPr>
-        <p:txBody>
-          <a:bodyPr/>
-          <a:lstStyle/>
-          <a:p>
-            <a:pPr algn="ctr"/>
-            <a:r>
-              <a:rPr lang="en-US" dirty="0"/>
-              <a:t>Traveling Salesperson</a:t>
-            </a:r>
-          </a:p>
-        </p:txBody>
-      </p:sp>
-    </p:spTree>
-    <p:extLst>
-      <p:ext uri="{BB962C8B-B14F-4D97-AF65-F5344CB8AC3E}">
-        <p14:creationId xmlns:p14="http://schemas.microsoft.com/office/powerpoint/2010/main" val="716826074"/>
-      </p:ext>
-    </p:extLst>
-  </p:cSld>
-  <p:clrMapOvr>
-    <a:masterClrMapping/>
-  </p:clrMapOvr>
-</p:sld>
-</file>
-
-<file path=ppt/slides/slide6.xml><?xml version="1.0" encoding="utf-8"?>
-<p:sld xmlns:a="http://schemas.openxmlformats.org/drawingml/2006/main" xmlns:r="http://schemas.openxmlformats.org/officeDocument/2006/relationships" xmlns:p="http://schemas.openxmlformats.org/presentationml/2006/main">
-  <p:cSld>
-    <p:spTree>
-      <p:nvGrpSpPr>
-        <p:cNvPr id="1" name=""/>
-        <p:cNvGrpSpPr/>
-        <p:nvPr/>
-      </p:nvGrpSpPr>
-      <p:grpSpPr>
-        <a:xfrm>
-          <a:off x="0" y="0"/>
-          <a:ext cx="0" cy="0"/>
-          <a:chOff x="0" y="0"/>
-          <a:chExt cx="0" cy="0"/>
-        </a:xfrm>
-      </p:grpSpPr>
-      <p:sp>
-        <p:nvSpPr>
-          <p:cNvPr id="2" name="Title 1">
-            <a:extLst>
-              <a:ext uri="{FF2B5EF4-FFF2-40B4-BE49-F238E27FC236}">
-                <a16:creationId xmlns:a16="http://schemas.microsoft.com/office/drawing/2014/main" id="{87719C56-21DC-0A40-AA49-9AF4AF4C92DA}"/>
-              </a:ext>
-            </a:extLst>
-          </p:cNvPr>
-          <p:cNvSpPr>
-            <a:spLocks noGrp="1"/>
-          </p:cNvSpPr>
-          <p:nvPr>
-            <p:ph type="title"/>
-          </p:nvPr>
-        </p:nvSpPr>
-        <p:spPr>
-          <a:xfrm>
-            <a:off x="1141411" y="1860330"/>
-            <a:ext cx="9906000" cy="2175149"/>
-          </a:xfrm>
-        </p:spPr>
-        <p:txBody>
-          <a:bodyPr/>
-          <a:lstStyle/>
-          <a:p>
-            <a:pPr algn="ctr"/>
-            <a:r>
-              <a:rPr lang="en-US" dirty="0"/>
-              <a:t>Set Cover</a:t>
-            </a:r>
-          </a:p>
-        </p:txBody>
-      </p:sp>
-    </p:spTree>
-    <p:extLst>
-      <p:ext uri="{BB962C8B-B14F-4D97-AF65-F5344CB8AC3E}">
-        <p14:creationId xmlns:p14="http://schemas.microsoft.com/office/powerpoint/2010/main" val="837661682"/>
-      </p:ext>
-    </p:extLst>
-  </p:cSld>
-  <p:clrMapOvr>
-    <a:masterClrMapping/>
-  </p:clrMapOvr>
-</p:sld>
-</file>
-
-<file path=ppt/slides/slide7.xml><?xml version="1.0" encoding="utf-8"?>
+<file path=ppt/slides/slide22.xml><?xml version="1.0" encoding="utf-8"?>
 <p:sld xmlns:a="http://schemas.openxmlformats.org/drawingml/2006/main" xmlns:r="http://schemas.openxmlformats.org/officeDocument/2006/relationships" xmlns:p="http://schemas.openxmlformats.org/presentationml/2006/main">
   <p:cSld>
     <p:spTree>
@@ -13622,7 +14952,7 @@
 </p:sld>
 </file>
 
-<file path=ppt/slides/slide8.xml><?xml version="1.0" encoding="utf-8"?>
+<file path=ppt/slides/slide23.xml><?xml version="1.0" encoding="utf-8"?>
 <p:sld xmlns:a="http://schemas.openxmlformats.org/drawingml/2006/main" xmlns:r="http://schemas.openxmlformats.org/officeDocument/2006/relationships" xmlns:p="http://schemas.openxmlformats.org/presentationml/2006/main">
   <p:cSld>
     <p:spTree>
@@ -13932,6 +15262,748 @@
     <p:extLst>
       <p:ext uri="{BB962C8B-B14F-4D97-AF65-F5344CB8AC3E}">
         <p14:creationId xmlns:p14="http://schemas.microsoft.com/office/powerpoint/2010/main" val="654641598"/>
+      </p:ext>
+    </p:extLst>
+  </p:cSld>
+  <p:clrMapOvr>
+    <a:masterClrMapping/>
+  </p:clrMapOvr>
+</p:sld>
+</file>
+
+<file path=ppt/slides/slide3.xml><?xml version="1.0" encoding="utf-8"?>
+<p:sld xmlns:a="http://schemas.openxmlformats.org/drawingml/2006/main" xmlns:r="http://schemas.openxmlformats.org/officeDocument/2006/relationships" xmlns:p="http://schemas.openxmlformats.org/presentationml/2006/main">
+  <p:cSld>
+    <p:spTree>
+      <p:nvGrpSpPr>
+        <p:cNvPr id="1" name=""/>
+        <p:cNvGrpSpPr/>
+        <p:nvPr/>
+      </p:nvGrpSpPr>
+      <p:grpSpPr>
+        <a:xfrm>
+          <a:off x="0" y="0"/>
+          <a:ext cx="0" cy="0"/>
+          <a:chOff x="0" y="0"/>
+          <a:chExt cx="0" cy="0"/>
+        </a:xfrm>
+      </p:grpSpPr>
+      <p:sp>
+        <p:nvSpPr>
+          <p:cNvPr id="2" name="Title 1">
+            <a:extLst>
+              <a:ext uri="{FF2B5EF4-FFF2-40B4-BE49-F238E27FC236}">
+                <a16:creationId xmlns:a16="http://schemas.microsoft.com/office/drawing/2014/main" id="{87719C56-21DC-0A40-AA49-9AF4AF4C92DA}"/>
+              </a:ext>
+            </a:extLst>
+          </p:cNvPr>
+          <p:cNvSpPr>
+            <a:spLocks noGrp="1"/>
+          </p:cNvSpPr>
+          <p:nvPr>
+            <p:ph type="title"/>
+          </p:nvPr>
+        </p:nvSpPr>
+        <p:spPr>
+          <a:xfrm>
+            <a:off x="1141411" y="1860330"/>
+            <a:ext cx="9906000" cy="2175149"/>
+          </a:xfrm>
+        </p:spPr>
+        <p:txBody>
+          <a:bodyPr/>
+          <a:lstStyle/>
+          <a:p>
+            <a:pPr algn="ctr"/>
+            <a:r>
+              <a:rPr lang="en-US" dirty="0"/>
+              <a:t>Introduction: Approximation</a:t>
+            </a:r>
+          </a:p>
+        </p:txBody>
+      </p:sp>
+    </p:spTree>
+    <p:extLst>
+      <p:ext uri="{BB962C8B-B14F-4D97-AF65-F5344CB8AC3E}">
+        <p14:creationId xmlns:p14="http://schemas.microsoft.com/office/powerpoint/2010/main" val="3558387040"/>
+      </p:ext>
+    </p:extLst>
+  </p:cSld>
+  <p:clrMapOvr>
+    <a:masterClrMapping/>
+  </p:clrMapOvr>
+</p:sld>
+</file>
+
+<file path=ppt/slides/slide4.xml><?xml version="1.0" encoding="utf-8"?>
+<p:sld xmlns:a="http://schemas.openxmlformats.org/drawingml/2006/main" xmlns:r="http://schemas.openxmlformats.org/officeDocument/2006/relationships" xmlns:p="http://schemas.openxmlformats.org/presentationml/2006/main">
+  <p:cSld>
+    <p:spTree>
+      <p:nvGrpSpPr>
+        <p:cNvPr id="1" name=""/>
+        <p:cNvGrpSpPr/>
+        <p:nvPr/>
+      </p:nvGrpSpPr>
+      <p:grpSpPr>
+        <a:xfrm>
+          <a:off x="0" y="0"/>
+          <a:ext cx="0" cy="0"/>
+          <a:chOff x="0" y="0"/>
+          <a:chExt cx="0" cy="0"/>
+        </a:xfrm>
+      </p:grpSpPr>
+      <p:pic>
+        <p:nvPicPr>
+          <p:cNvPr id="5" name="Picture 4">
+            <a:extLst>
+              <a:ext uri="{FF2B5EF4-FFF2-40B4-BE49-F238E27FC236}">
+                <a16:creationId xmlns:a16="http://schemas.microsoft.com/office/drawing/2014/main" id="{20CD35E7-E86C-304C-8BB8-60F7C3D74DA4}"/>
+              </a:ext>
+            </a:extLst>
+          </p:cNvPr>
+          <p:cNvPicPr>
+            <a:picLocks noChangeAspect="1"/>
+          </p:cNvPicPr>
+          <p:nvPr/>
+        </p:nvPicPr>
+        <p:blipFill>
+          <a:blip r:embed="rId2"/>
+          <a:stretch>
+            <a:fillRect/>
+          </a:stretch>
+        </p:blipFill>
+        <p:spPr>
+          <a:xfrm>
+            <a:off x="619990" y="2799773"/>
+            <a:ext cx="10084173" cy="2000828"/>
+          </a:xfrm>
+          <a:prstGeom prst="rect">
+            <a:avLst/>
+          </a:prstGeom>
+        </p:spPr>
+      </p:pic>
+      <p:sp>
+        <p:nvSpPr>
+          <p:cNvPr id="6" name="Title 1">
+            <a:extLst>
+              <a:ext uri="{FF2B5EF4-FFF2-40B4-BE49-F238E27FC236}">
+                <a16:creationId xmlns:a16="http://schemas.microsoft.com/office/drawing/2014/main" id="{CEDA7E1F-EA10-664E-B135-4A53E08CED96}"/>
+              </a:ext>
+            </a:extLst>
+          </p:cNvPr>
+          <p:cNvSpPr>
+            <a:spLocks noGrp="1"/>
+          </p:cNvSpPr>
+          <p:nvPr>
+            <p:ph type="title"/>
+          </p:nvPr>
+        </p:nvSpPr>
+        <p:spPr>
+          <a:xfrm>
+            <a:off x="1141412" y="228903"/>
+            <a:ext cx="9905998" cy="860425"/>
+          </a:xfrm>
+        </p:spPr>
+        <p:txBody>
+          <a:bodyPr/>
+          <a:lstStyle/>
+          <a:p>
+            <a:pPr algn="ctr"/>
+            <a:r>
+              <a:rPr lang="en-US" dirty="0"/>
+              <a:t>Approximation Ratios</a:t>
+            </a:r>
+          </a:p>
+        </p:txBody>
+      </p:sp>
+    </p:spTree>
+    <p:extLst>
+      <p:ext uri="{BB962C8B-B14F-4D97-AF65-F5344CB8AC3E}">
+        <p14:creationId xmlns:p14="http://schemas.microsoft.com/office/powerpoint/2010/main" val="1889861670"/>
+      </p:ext>
+    </p:extLst>
+  </p:cSld>
+  <p:clrMapOvr>
+    <a:masterClrMapping/>
+  </p:clrMapOvr>
+</p:sld>
+</file>
+
+<file path=ppt/slides/slide5.xml><?xml version="1.0" encoding="utf-8"?>
+<p:sld xmlns:a="http://schemas.openxmlformats.org/drawingml/2006/main" xmlns:r="http://schemas.openxmlformats.org/officeDocument/2006/relationships" xmlns:p="http://schemas.openxmlformats.org/presentationml/2006/main">
+  <p:cSld>
+    <p:spTree>
+      <p:nvGrpSpPr>
+        <p:cNvPr id="1" name=""/>
+        <p:cNvGrpSpPr/>
+        <p:nvPr/>
+      </p:nvGrpSpPr>
+      <p:grpSpPr>
+        <a:xfrm>
+          <a:off x="0" y="0"/>
+          <a:ext cx="0" cy="0"/>
+          <a:chOff x="0" y="0"/>
+          <a:chExt cx="0" cy="0"/>
+        </a:xfrm>
+      </p:grpSpPr>
+      <p:sp>
+        <p:nvSpPr>
+          <p:cNvPr id="6" name="Title 1">
+            <a:extLst>
+              <a:ext uri="{FF2B5EF4-FFF2-40B4-BE49-F238E27FC236}">
+                <a16:creationId xmlns:a16="http://schemas.microsoft.com/office/drawing/2014/main" id="{CEDA7E1F-EA10-664E-B135-4A53E08CED96}"/>
+              </a:ext>
+            </a:extLst>
+          </p:cNvPr>
+          <p:cNvSpPr>
+            <a:spLocks noGrp="1"/>
+          </p:cNvSpPr>
+          <p:nvPr>
+            <p:ph type="title"/>
+          </p:nvPr>
+        </p:nvSpPr>
+        <p:spPr>
+          <a:xfrm>
+            <a:off x="1141412" y="228903"/>
+            <a:ext cx="9905998" cy="860425"/>
+          </a:xfrm>
+        </p:spPr>
+        <p:txBody>
+          <a:bodyPr/>
+          <a:lstStyle/>
+          <a:p>
+            <a:pPr algn="ctr"/>
+            <a:r>
+              <a:rPr lang="en-US" dirty="0"/>
+              <a:t>Some Definitions</a:t>
+            </a:r>
+          </a:p>
+        </p:txBody>
+      </p:sp>
+      <p:pic>
+        <p:nvPicPr>
+          <p:cNvPr id="3" name="Picture 2">
+            <a:extLst>
+              <a:ext uri="{FF2B5EF4-FFF2-40B4-BE49-F238E27FC236}">
+                <a16:creationId xmlns:a16="http://schemas.microsoft.com/office/drawing/2014/main" id="{CAD237E6-7E69-7E43-AF75-E52C43EC6337}"/>
+              </a:ext>
+            </a:extLst>
+          </p:cNvPr>
+          <p:cNvPicPr>
+            <a:picLocks noChangeAspect="1"/>
+          </p:cNvPicPr>
+          <p:nvPr/>
+        </p:nvPicPr>
+        <p:blipFill>
+          <a:blip r:embed="rId2"/>
+          <a:stretch>
+            <a:fillRect/>
+          </a:stretch>
+        </p:blipFill>
+        <p:spPr>
+          <a:xfrm>
+            <a:off x="1380258" y="2064328"/>
+            <a:ext cx="5712667" cy="3494808"/>
+          </a:xfrm>
+          <a:prstGeom prst="rect">
+            <a:avLst/>
+          </a:prstGeom>
+        </p:spPr>
+      </p:pic>
+    </p:spTree>
+    <p:extLst>
+      <p:ext uri="{BB962C8B-B14F-4D97-AF65-F5344CB8AC3E}">
+        <p14:creationId xmlns:p14="http://schemas.microsoft.com/office/powerpoint/2010/main" val="1935632965"/>
+      </p:ext>
+    </p:extLst>
+  </p:cSld>
+  <p:clrMapOvr>
+    <a:masterClrMapping/>
+  </p:clrMapOvr>
+</p:sld>
+</file>
+
+<file path=ppt/slides/slide6.xml><?xml version="1.0" encoding="utf-8"?>
+<p:sld xmlns:a="http://schemas.openxmlformats.org/drawingml/2006/main" xmlns:r="http://schemas.openxmlformats.org/officeDocument/2006/relationships" xmlns:p="http://schemas.openxmlformats.org/presentationml/2006/main">
+  <p:cSld>
+    <p:spTree>
+      <p:nvGrpSpPr>
+        <p:cNvPr id="1" name=""/>
+        <p:cNvGrpSpPr/>
+        <p:nvPr/>
+      </p:nvGrpSpPr>
+      <p:grpSpPr>
+        <a:xfrm>
+          <a:off x="0" y="0"/>
+          <a:ext cx="0" cy="0"/>
+          <a:chOff x="0" y="0"/>
+          <a:chExt cx="0" cy="0"/>
+        </a:xfrm>
+      </p:grpSpPr>
+      <p:sp>
+        <p:nvSpPr>
+          <p:cNvPr id="2" name="Title 1">
+            <a:extLst>
+              <a:ext uri="{FF2B5EF4-FFF2-40B4-BE49-F238E27FC236}">
+                <a16:creationId xmlns:a16="http://schemas.microsoft.com/office/drawing/2014/main" id="{87719C56-21DC-0A40-AA49-9AF4AF4C92DA}"/>
+              </a:ext>
+            </a:extLst>
+          </p:cNvPr>
+          <p:cNvSpPr>
+            <a:spLocks noGrp="1"/>
+          </p:cNvSpPr>
+          <p:nvPr>
+            <p:ph type="title"/>
+          </p:nvPr>
+        </p:nvSpPr>
+        <p:spPr>
+          <a:xfrm>
+            <a:off x="1141411" y="1860330"/>
+            <a:ext cx="9906000" cy="2175149"/>
+          </a:xfrm>
+        </p:spPr>
+        <p:txBody>
+          <a:bodyPr/>
+          <a:lstStyle/>
+          <a:p>
+            <a:pPr algn="ctr"/>
+            <a:r>
+              <a:rPr lang="en-US" dirty="0"/>
+              <a:t>Vertex-Cover</a:t>
+            </a:r>
+          </a:p>
+        </p:txBody>
+      </p:sp>
+    </p:spTree>
+    <p:extLst>
+      <p:ext uri="{BB962C8B-B14F-4D97-AF65-F5344CB8AC3E}">
+        <p14:creationId xmlns:p14="http://schemas.microsoft.com/office/powerpoint/2010/main" val="1586894801"/>
+      </p:ext>
+    </p:extLst>
+  </p:cSld>
+  <p:clrMapOvr>
+    <a:masterClrMapping/>
+  </p:clrMapOvr>
+</p:sld>
+</file>
+
+<file path=ppt/slides/slide7.xml><?xml version="1.0" encoding="utf-8"?>
+<p:sld xmlns:a="http://schemas.openxmlformats.org/drawingml/2006/main" xmlns:r="http://schemas.openxmlformats.org/officeDocument/2006/relationships" xmlns:p="http://schemas.openxmlformats.org/presentationml/2006/main">
+  <p:cSld>
+    <p:spTree>
+      <p:nvGrpSpPr>
+        <p:cNvPr id="1" name=""/>
+        <p:cNvGrpSpPr/>
+        <p:nvPr/>
+      </p:nvGrpSpPr>
+      <p:grpSpPr>
+        <a:xfrm>
+          <a:off x="0" y="0"/>
+          <a:ext cx="0" cy="0"/>
+          <a:chOff x="0" y="0"/>
+          <a:chExt cx="0" cy="0"/>
+        </a:xfrm>
+      </p:grpSpPr>
+      <p:sp>
+        <p:nvSpPr>
+          <p:cNvPr id="6" name="Title 1">
+            <a:extLst>
+              <a:ext uri="{FF2B5EF4-FFF2-40B4-BE49-F238E27FC236}">
+                <a16:creationId xmlns:a16="http://schemas.microsoft.com/office/drawing/2014/main" id="{CEDA7E1F-EA10-664E-B135-4A53E08CED96}"/>
+              </a:ext>
+            </a:extLst>
+          </p:cNvPr>
+          <p:cNvSpPr>
+            <a:spLocks noGrp="1"/>
+          </p:cNvSpPr>
+          <p:nvPr>
+            <p:ph type="title"/>
+          </p:nvPr>
+        </p:nvSpPr>
+        <p:spPr>
+          <a:xfrm>
+            <a:off x="1141412" y="228903"/>
+            <a:ext cx="9905998" cy="860425"/>
+          </a:xfrm>
+        </p:spPr>
+        <p:txBody>
+          <a:bodyPr/>
+          <a:lstStyle/>
+          <a:p>
+            <a:pPr algn="ctr"/>
+            <a:r>
+              <a:rPr lang="en-US" dirty="0"/>
+              <a:t>Recall Vertex-Cover</a:t>
+            </a:r>
+          </a:p>
+        </p:txBody>
+      </p:sp>
+      <p:sp>
+        <p:nvSpPr>
+          <p:cNvPr id="2" name="TextBox 1">
+            <a:extLst>
+              <a:ext uri="{FF2B5EF4-FFF2-40B4-BE49-F238E27FC236}">
+                <a16:creationId xmlns:a16="http://schemas.microsoft.com/office/drawing/2014/main" id="{E5D1DC23-009C-4345-AACE-883EA6E42F99}"/>
+              </a:ext>
+            </a:extLst>
+          </p:cNvPr>
+          <p:cNvSpPr txBox="1"/>
+          <p:nvPr/>
+        </p:nvSpPr>
+        <p:spPr>
+          <a:xfrm>
+            <a:off x="1465118" y="2421082"/>
+            <a:ext cx="3179618" cy="646331"/>
+          </a:xfrm>
+          <a:prstGeom prst="rect">
+            <a:avLst/>
+          </a:prstGeom>
+          <a:noFill/>
+        </p:spPr>
+        <p:txBody>
+          <a:bodyPr wrap="square" rtlCol="0">
+            <a:spAutoFit/>
+          </a:bodyPr>
+          <a:lstStyle/>
+          <a:p>
+            <a:r>
+              <a:rPr lang="en-US" dirty="0"/>
+              <a:t>Show an example graph and it’s smallest vertex cover</a:t>
+            </a:r>
+          </a:p>
+        </p:txBody>
+      </p:sp>
+    </p:spTree>
+    <p:extLst>
+      <p:ext uri="{BB962C8B-B14F-4D97-AF65-F5344CB8AC3E}">
+        <p14:creationId xmlns:p14="http://schemas.microsoft.com/office/powerpoint/2010/main" val="3664405419"/>
+      </p:ext>
+    </p:extLst>
+  </p:cSld>
+  <p:clrMapOvr>
+    <a:masterClrMapping/>
+  </p:clrMapOvr>
+</p:sld>
+</file>
+
+<file path=ppt/slides/slide8.xml><?xml version="1.0" encoding="utf-8"?>
+<p:sld xmlns:a="http://schemas.openxmlformats.org/drawingml/2006/main" xmlns:r="http://schemas.openxmlformats.org/officeDocument/2006/relationships" xmlns:p="http://schemas.openxmlformats.org/presentationml/2006/main">
+  <p:cSld>
+    <p:spTree>
+      <p:nvGrpSpPr>
+        <p:cNvPr id="1" name=""/>
+        <p:cNvGrpSpPr/>
+        <p:nvPr/>
+      </p:nvGrpSpPr>
+      <p:grpSpPr>
+        <a:xfrm>
+          <a:off x="0" y="0"/>
+          <a:ext cx="0" cy="0"/>
+          <a:chOff x="0" y="0"/>
+          <a:chExt cx="0" cy="0"/>
+        </a:xfrm>
+      </p:grpSpPr>
+      <p:sp>
+        <p:nvSpPr>
+          <p:cNvPr id="6" name="Title 1">
+            <a:extLst>
+              <a:ext uri="{FF2B5EF4-FFF2-40B4-BE49-F238E27FC236}">
+                <a16:creationId xmlns:a16="http://schemas.microsoft.com/office/drawing/2014/main" id="{CEDA7E1F-EA10-664E-B135-4A53E08CED96}"/>
+              </a:ext>
+            </a:extLst>
+          </p:cNvPr>
+          <p:cNvSpPr>
+            <a:spLocks noGrp="1"/>
+          </p:cNvSpPr>
+          <p:nvPr>
+            <p:ph type="title"/>
+          </p:nvPr>
+        </p:nvSpPr>
+        <p:spPr>
+          <a:xfrm>
+            <a:off x="1141412" y="228903"/>
+            <a:ext cx="9905998" cy="860425"/>
+          </a:xfrm>
+        </p:spPr>
+        <p:txBody>
+          <a:bodyPr/>
+          <a:lstStyle/>
+          <a:p>
+            <a:pPr algn="ctr"/>
+            <a:r>
+              <a:rPr lang="en-US" dirty="0"/>
+              <a:t>Approximating Vertex-Cover</a:t>
+            </a:r>
+          </a:p>
+        </p:txBody>
+      </p:sp>
+      <p:sp>
+        <p:nvSpPr>
+          <p:cNvPr id="2" name="TextBox 1">
+            <a:extLst>
+              <a:ext uri="{FF2B5EF4-FFF2-40B4-BE49-F238E27FC236}">
+                <a16:creationId xmlns:a16="http://schemas.microsoft.com/office/drawing/2014/main" id="{E5D1DC23-009C-4345-AACE-883EA6E42F99}"/>
+              </a:ext>
+            </a:extLst>
+          </p:cNvPr>
+          <p:cNvSpPr txBox="1"/>
+          <p:nvPr/>
+        </p:nvSpPr>
+        <p:spPr>
+          <a:xfrm>
+            <a:off x="1141412" y="1797627"/>
+            <a:ext cx="3179618" cy="369332"/>
+          </a:xfrm>
+          <a:prstGeom prst="rect">
+            <a:avLst/>
+          </a:prstGeom>
+          <a:noFill/>
+        </p:spPr>
+        <p:txBody>
+          <a:bodyPr wrap="square" rtlCol="0">
+            <a:spAutoFit/>
+          </a:bodyPr>
+          <a:lstStyle/>
+          <a:p>
+            <a:r>
+              <a:rPr lang="en-US" dirty="0"/>
+              <a:t>Text box here</a:t>
+            </a:r>
+          </a:p>
+        </p:txBody>
+      </p:sp>
+      <p:pic>
+        <p:nvPicPr>
+          <p:cNvPr id="4" name="Picture 3">
+            <a:extLst>
+              <a:ext uri="{FF2B5EF4-FFF2-40B4-BE49-F238E27FC236}">
+                <a16:creationId xmlns:a16="http://schemas.microsoft.com/office/drawing/2014/main" id="{58E2C4E2-36DA-494A-98A7-2C9FF22E6A53}"/>
+              </a:ext>
+            </a:extLst>
+          </p:cNvPr>
+          <p:cNvPicPr>
+            <a:picLocks noChangeAspect="1"/>
+          </p:cNvPicPr>
+          <p:nvPr/>
+        </p:nvPicPr>
+        <p:blipFill>
+          <a:blip r:embed="rId2"/>
+          <a:stretch>
+            <a:fillRect/>
+          </a:stretch>
+        </p:blipFill>
+        <p:spPr>
+          <a:xfrm>
+            <a:off x="840075" y="2617354"/>
+            <a:ext cx="4747322" cy="2006600"/>
+          </a:xfrm>
+          <a:prstGeom prst="rect">
+            <a:avLst/>
+          </a:prstGeom>
+        </p:spPr>
+      </p:pic>
+      <p:pic>
+        <p:nvPicPr>
+          <p:cNvPr id="7" name="Picture 6">
+            <a:extLst>
+              <a:ext uri="{FF2B5EF4-FFF2-40B4-BE49-F238E27FC236}">
+                <a16:creationId xmlns:a16="http://schemas.microsoft.com/office/drawing/2014/main" id="{3B31C0CA-5D17-174C-85E1-77E2CA9CD8AF}"/>
+              </a:ext>
+            </a:extLst>
+          </p:cNvPr>
+          <p:cNvPicPr>
+            <a:picLocks noChangeAspect="1"/>
+          </p:cNvPicPr>
+          <p:nvPr/>
+        </p:nvPicPr>
+        <p:blipFill>
+          <a:blip r:embed="rId3"/>
+          <a:stretch>
+            <a:fillRect/>
+          </a:stretch>
+        </p:blipFill>
+        <p:spPr>
+          <a:xfrm>
+            <a:off x="6103503" y="1797627"/>
+            <a:ext cx="4624377" cy="4302992"/>
+          </a:xfrm>
+          <a:prstGeom prst="rect">
+            <a:avLst/>
+          </a:prstGeom>
+        </p:spPr>
+      </p:pic>
+    </p:spTree>
+    <p:extLst>
+      <p:ext uri="{BB962C8B-B14F-4D97-AF65-F5344CB8AC3E}">
+        <p14:creationId xmlns:p14="http://schemas.microsoft.com/office/powerpoint/2010/main" val="1425415951"/>
+      </p:ext>
+    </p:extLst>
+  </p:cSld>
+  <p:clrMapOvr>
+    <a:masterClrMapping/>
+  </p:clrMapOvr>
+</p:sld>
+</file>
+
+<file path=ppt/slides/slide9.xml><?xml version="1.0" encoding="utf-8"?>
+<p:sld xmlns:a="http://schemas.openxmlformats.org/drawingml/2006/main" xmlns:r="http://schemas.openxmlformats.org/officeDocument/2006/relationships" xmlns:p="http://schemas.openxmlformats.org/presentationml/2006/main">
+  <p:cSld>
+    <p:spTree>
+      <p:nvGrpSpPr>
+        <p:cNvPr id="1" name=""/>
+        <p:cNvGrpSpPr/>
+        <p:nvPr/>
+      </p:nvGrpSpPr>
+      <p:grpSpPr>
+        <a:xfrm>
+          <a:off x="0" y="0"/>
+          <a:ext cx="0" cy="0"/>
+          <a:chOff x="0" y="0"/>
+          <a:chExt cx="0" cy="0"/>
+        </a:xfrm>
+      </p:grpSpPr>
+      <p:sp>
+        <p:nvSpPr>
+          <p:cNvPr id="6" name="Title 1">
+            <a:extLst>
+              <a:ext uri="{FF2B5EF4-FFF2-40B4-BE49-F238E27FC236}">
+                <a16:creationId xmlns:a16="http://schemas.microsoft.com/office/drawing/2014/main" id="{CEDA7E1F-EA10-664E-B135-4A53E08CED96}"/>
+              </a:ext>
+            </a:extLst>
+          </p:cNvPr>
+          <p:cNvSpPr>
+            <a:spLocks noGrp="1"/>
+          </p:cNvSpPr>
+          <p:nvPr>
+            <p:ph type="title"/>
+          </p:nvPr>
+        </p:nvSpPr>
+        <p:spPr>
+          <a:xfrm>
+            <a:off x="1141412" y="228903"/>
+            <a:ext cx="9905998" cy="860425"/>
+          </a:xfrm>
+        </p:spPr>
+        <p:txBody>
+          <a:bodyPr/>
+          <a:lstStyle/>
+          <a:p>
+            <a:pPr algn="ctr"/>
+            <a:r>
+              <a:rPr lang="en-US" dirty="0" err="1"/>
+              <a:t>Approx</a:t>
+            </a:r>
+            <a:r>
+              <a:rPr lang="en-US" dirty="0"/>
+              <a:t>-Vert-Cover: Analysis</a:t>
+            </a:r>
+          </a:p>
+        </p:txBody>
+      </p:sp>
+      <p:sp>
+        <p:nvSpPr>
+          <p:cNvPr id="2" name="TextBox 1">
+            <a:extLst>
+              <a:ext uri="{FF2B5EF4-FFF2-40B4-BE49-F238E27FC236}">
+                <a16:creationId xmlns:a16="http://schemas.microsoft.com/office/drawing/2014/main" id="{E5D1DC23-009C-4345-AACE-883EA6E42F99}"/>
+              </a:ext>
+            </a:extLst>
+          </p:cNvPr>
+          <p:cNvSpPr txBox="1"/>
+          <p:nvPr/>
+        </p:nvSpPr>
+        <p:spPr>
+          <a:xfrm>
+            <a:off x="1141412" y="1797627"/>
+            <a:ext cx="3179618" cy="369332"/>
+          </a:xfrm>
+          <a:prstGeom prst="rect">
+            <a:avLst/>
+          </a:prstGeom>
+          <a:noFill/>
+        </p:spPr>
+        <p:txBody>
+          <a:bodyPr wrap="square" rtlCol="0">
+            <a:spAutoFit/>
+          </a:bodyPr>
+          <a:lstStyle/>
+          <a:p>
+            <a:r>
+              <a:rPr lang="en-US" dirty="0"/>
+              <a:t>Runtime is polynomial? Yes!</a:t>
+            </a:r>
+          </a:p>
+        </p:txBody>
+      </p:sp>
+      <p:pic>
+        <p:nvPicPr>
+          <p:cNvPr id="4" name="Picture 3">
+            <a:extLst>
+              <a:ext uri="{FF2B5EF4-FFF2-40B4-BE49-F238E27FC236}">
+                <a16:creationId xmlns:a16="http://schemas.microsoft.com/office/drawing/2014/main" id="{58E2C4E2-36DA-494A-98A7-2C9FF22E6A53}"/>
+              </a:ext>
+            </a:extLst>
+          </p:cNvPr>
+          <p:cNvPicPr>
+            <a:picLocks noChangeAspect="1"/>
+          </p:cNvPicPr>
+          <p:nvPr/>
+        </p:nvPicPr>
+        <p:blipFill>
+          <a:blip r:embed="rId2"/>
+          <a:stretch>
+            <a:fillRect/>
+          </a:stretch>
+        </p:blipFill>
+        <p:spPr>
+          <a:xfrm>
+            <a:off x="840075" y="2617354"/>
+            <a:ext cx="4747322" cy="2006600"/>
+          </a:xfrm>
+          <a:prstGeom prst="rect">
+            <a:avLst/>
+          </a:prstGeom>
+        </p:spPr>
+      </p:pic>
+      <p:sp>
+        <p:nvSpPr>
+          <p:cNvPr id="8" name="TextBox 7">
+            <a:extLst>
+              <a:ext uri="{FF2B5EF4-FFF2-40B4-BE49-F238E27FC236}">
+                <a16:creationId xmlns:a16="http://schemas.microsoft.com/office/drawing/2014/main" id="{2433B4B9-DF60-D14D-B949-7C3D8B207D53}"/>
+              </a:ext>
+            </a:extLst>
+          </p:cNvPr>
+          <p:cNvSpPr txBox="1"/>
+          <p:nvPr/>
+        </p:nvSpPr>
+        <p:spPr>
+          <a:xfrm>
+            <a:off x="7867792" y="1797627"/>
+            <a:ext cx="3179618" cy="369332"/>
+          </a:xfrm>
+          <a:prstGeom prst="rect">
+            <a:avLst/>
+          </a:prstGeom>
+          <a:noFill/>
+        </p:spPr>
+        <p:txBody>
+          <a:bodyPr wrap="square" rtlCol="0">
+            <a:spAutoFit/>
+          </a:bodyPr>
+          <a:lstStyle/>
+          <a:p>
+            <a:r>
+              <a:rPr lang="en-US" dirty="0"/>
+              <a:t>What is the approx. ratio??</a:t>
+            </a:r>
+          </a:p>
+        </p:txBody>
+      </p:sp>
+    </p:spTree>
+    <p:extLst>
+      <p:ext uri="{BB962C8B-B14F-4D97-AF65-F5344CB8AC3E}">
+        <p14:creationId xmlns:p14="http://schemas.microsoft.com/office/powerpoint/2010/main" val="477699963"/>
       </p:ext>
     </p:extLst>
   </p:cSld>

</xml_diff>